<commit_message>
added footnote mentioning Biohackathon to default slide template
</commit_message>
<xml_diff>
--- a/templates/Biohackathon-presentation_template.pptx
+++ b/templates/Biohackathon-presentation_template.pptx
@@ -699,7 +699,7 @@
   <p:cSld>
     <p:spTree>
       <p:nvGrpSpPr>
-        <p:cNvPr id="42" name="Shape 42"/>
+        <p:cNvPr id="62" name="Shape 62"/>
         <p:cNvGrpSpPr/>
         <p:nvPr/>
       </p:nvGrpSpPr>
@@ -713,7 +713,7 @@
       </p:grpSpPr>
       <p:sp>
         <p:nvSpPr>
-          <p:cNvPr id="43" name="Google Shape;43;p:notes"/>
+          <p:cNvPr id="63" name="Google Shape;63;p:notes"/>
           <p:cNvSpPr/>
           <p:nvPr>
             <p:ph idx="2" type="sldImg"/>
@@ -748,7 +748,7 @@
       </p:sp>
       <p:sp>
         <p:nvSpPr>
-          <p:cNvPr id="44" name="Google Shape;44;p:notes"/>
+          <p:cNvPr id="64" name="Google Shape;64;p:notes"/>
           <p:cNvSpPr txBox="1"/>
           <p:nvPr>
             <p:ph idx="1" type="body"/>
@@ -798,7 +798,7 @@
   <p:cSld>
     <p:spTree>
       <p:nvGrpSpPr>
-        <p:cNvPr id="98" name="Shape 98"/>
+        <p:cNvPr id="118" name="Shape 118"/>
         <p:cNvGrpSpPr/>
         <p:nvPr/>
       </p:nvGrpSpPr>
@@ -812,7 +812,7 @@
       </p:grpSpPr>
       <p:sp>
         <p:nvSpPr>
-          <p:cNvPr id="99" name="Google Shape;99;g4697239a74_0_619:notes"/>
+          <p:cNvPr id="119" name="Google Shape;119;g4697239a74_0_619:notes"/>
           <p:cNvSpPr/>
           <p:nvPr>
             <p:ph idx="2" type="sldImg"/>
@@ -847,7 +847,7 @@
       </p:sp>
       <p:sp>
         <p:nvSpPr>
-          <p:cNvPr id="100" name="Google Shape;100;g4697239a74_0_619:notes"/>
+          <p:cNvPr id="120" name="Google Shape;120;g4697239a74_0_619:notes"/>
           <p:cNvSpPr txBox="1"/>
           <p:nvPr>
             <p:ph idx="1" type="body"/>
@@ -897,7 +897,7 @@
   <p:cSld>
     <p:spTree>
       <p:nvGrpSpPr>
-        <p:cNvPr id="105" name="Shape 105"/>
+        <p:cNvPr id="125" name="Shape 125"/>
         <p:cNvGrpSpPr/>
         <p:nvPr/>
       </p:nvGrpSpPr>
@@ -911,7 +911,7 @@
       </p:grpSpPr>
       <p:sp>
         <p:nvSpPr>
-          <p:cNvPr id="106" name="Google Shape;106;g443aecb26f_0_55:notes"/>
+          <p:cNvPr id="126" name="Google Shape;126;g443aecb26f_0_55:notes"/>
           <p:cNvSpPr/>
           <p:nvPr>
             <p:ph idx="2" type="sldImg"/>
@@ -946,7 +946,7 @@
       </p:sp>
       <p:sp>
         <p:nvSpPr>
-          <p:cNvPr id="107" name="Google Shape;107;g443aecb26f_0_55:notes"/>
+          <p:cNvPr id="127" name="Google Shape;127;g443aecb26f_0_55:notes"/>
           <p:cNvSpPr txBox="1"/>
           <p:nvPr>
             <p:ph idx="1" type="body"/>
@@ -996,7 +996,7 @@
   <p:cSld>
     <p:spTree>
       <p:nvGrpSpPr>
-        <p:cNvPr id="49" name="Shape 49"/>
+        <p:cNvPr id="69" name="Shape 69"/>
         <p:cNvGrpSpPr/>
         <p:nvPr/>
       </p:nvGrpSpPr>
@@ -1010,7 +1010,7 @@
       </p:grpSpPr>
       <p:sp>
         <p:nvSpPr>
-          <p:cNvPr id="50" name="Google Shape;50;g4697239a74_0_287:notes"/>
+          <p:cNvPr id="70" name="Google Shape;70;g4697239a74_0_287:notes"/>
           <p:cNvSpPr/>
           <p:nvPr>
             <p:ph idx="2" type="sldImg"/>
@@ -1045,7 +1045,7 @@
       </p:sp>
       <p:sp>
         <p:nvSpPr>
-          <p:cNvPr id="51" name="Google Shape;51;g4697239a74_0_287:notes"/>
+          <p:cNvPr id="71" name="Google Shape;71;g4697239a74_0_287:notes"/>
           <p:cNvSpPr txBox="1"/>
           <p:nvPr>
             <p:ph idx="1" type="body"/>
@@ -1095,7 +1095,7 @@
   <p:cSld>
     <p:spTree>
       <p:nvGrpSpPr>
-        <p:cNvPr id="54" name="Shape 54"/>
+        <p:cNvPr id="74" name="Shape 74"/>
         <p:cNvGrpSpPr/>
         <p:nvPr/>
       </p:nvGrpSpPr>
@@ -1109,7 +1109,7 @@
       </p:grpSpPr>
       <p:sp>
         <p:nvSpPr>
-          <p:cNvPr id="55" name="Google Shape;55;g4697239a74_0_282:notes"/>
+          <p:cNvPr id="75" name="Google Shape;75;g4697239a74_0_282:notes"/>
           <p:cNvSpPr/>
           <p:nvPr>
             <p:ph idx="2" type="sldImg"/>
@@ -1144,7 +1144,7 @@
       </p:sp>
       <p:sp>
         <p:nvSpPr>
-          <p:cNvPr id="56" name="Google Shape;56;g4697239a74_0_282:notes"/>
+          <p:cNvPr id="76" name="Google Shape;76;g4697239a74_0_282:notes"/>
           <p:cNvSpPr txBox="1"/>
           <p:nvPr>
             <p:ph idx="1" type="body"/>
@@ -1194,7 +1194,7 @@
   <p:cSld>
     <p:spTree>
       <p:nvGrpSpPr>
-        <p:cNvPr id="61" name="Shape 61"/>
+        <p:cNvPr id="81" name="Shape 81"/>
         <p:cNvGrpSpPr/>
         <p:nvPr/>
       </p:nvGrpSpPr>
@@ -1208,7 +1208,7 @@
       </p:grpSpPr>
       <p:sp>
         <p:nvSpPr>
-          <p:cNvPr id="62" name="Google Shape;62;g4697239a74_0_598:notes"/>
+          <p:cNvPr id="82" name="Google Shape;82;g4697239a74_0_598:notes"/>
           <p:cNvSpPr/>
           <p:nvPr>
             <p:ph idx="2" type="sldImg"/>
@@ -1243,7 +1243,7 @@
       </p:sp>
       <p:sp>
         <p:nvSpPr>
-          <p:cNvPr id="63" name="Google Shape;63;g4697239a74_0_598:notes"/>
+          <p:cNvPr id="83" name="Google Shape;83;g4697239a74_0_598:notes"/>
           <p:cNvSpPr txBox="1"/>
           <p:nvPr>
             <p:ph idx="1" type="body"/>
@@ -1293,7 +1293,7 @@
   <p:cSld>
     <p:spTree>
       <p:nvGrpSpPr>
-        <p:cNvPr id="68" name="Shape 68"/>
+        <p:cNvPr id="88" name="Shape 88"/>
         <p:cNvGrpSpPr/>
         <p:nvPr/>
       </p:nvGrpSpPr>
@@ -1307,7 +1307,7 @@
       </p:grpSpPr>
       <p:sp>
         <p:nvSpPr>
-          <p:cNvPr id="69" name="Google Shape;69;g4697239a74_0_292:notes"/>
+          <p:cNvPr id="89" name="Google Shape;89;g4697239a74_0_292:notes"/>
           <p:cNvSpPr/>
           <p:nvPr>
             <p:ph idx="2" type="sldImg"/>
@@ -1342,7 +1342,7 @@
       </p:sp>
       <p:sp>
         <p:nvSpPr>
-          <p:cNvPr id="70" name="Google Shape;70;g4697239a74_0_292:notes"/>
+          <p:cNvPr id="90" name="Google Shape;90;g4697239a74_0_292:notes"/>
           <p:cNvSpPr txBox="1"/>
           <p:nvPr>
             <p:ph idx="1" type="body"/>
@@ -1392,7 +1392,7 @@
   <p:cSld>
     <p:spTree>
       <p:nvGrpSpPr>
-        <p:cNvPr id="73" name="Shape 73"/>
+        <p:cNvPr id="93" name="Shape 93"/>
         <p:cNvGrpSpPr/>
         <p:nvPr/>
       </p:nvGrpSpPr>
@@ -1406,7 +1406,7 @@
       </p:grpSpPr>
       <p:sp>
         <p:nvSpPr>
-          <p:cNvPr id="74" name="Google Shape;74;g4697239a74_0_609:notes"/>
+          <p:cNvPr id="94" name="Google Shape;94;g4697239a74_0_609:notes"/>
           <p:cNvSpPr/>
           <p:nvPr>
             <p:ph idx="2" type="sldImg"/>
@@ -1441,7 +1441,7 @@
       </p:sp>
       <p:sp>
         <p:nvSpPr>
-          <p:cNvPr id="75" name="Google Shape;75;g4697239a74_0_609:notes"/>
+          <p:cNvPr id="95" name="Google Shape;95;g4697239a74_0_609:notes"/>
           <p:cNvSpPr txBox="1"/>
           <p:nvPr>
             <p:ph idx="1" type="body"/>
@@ -1491,7 +1491,7 @@
   <p:cSld>
     <p:spTree>
       <p:nvGrpSpPr>
-        <p:cNvPr id="79" name="Shape 79"/>
+        <p:cNvPr id="99" name="Shape 99"/>
         <p:cNvGrpSpPr/>
         <p:nvPr/>
       </p:nvGrpSpPr>
@@ -1505,7 +1505,7 @@
       </p:grpSpPr>
       <p:sp>
         <p:nvSpPr>
-          <p:cNvPr id="80" name="Google Shape;80;g443aecb26f_0_22:notes"/>
+          <p:cNvPr id="100" name="Google Shape;100;g443aecb26f_0_22:notes"/>
           <p:cNvSpPr/>
           <p:nvPr>
             <p:ph idx="2" type="sldImg"/>
@@ -1540,7 +1540,7 @@
       </p:sp>
       <p:sp>
         <p:nvSpPr>
-          <p:cNvPr id="81" name="Google Shape;81;g443aecb26f_0_22:notes"/>
+          <p:cNvPr id="101" name="Google Shape;101;g443aecb26f_0_22:notes"/>
           <p:cNvSpPr txBox="1"/>
           <p:nvPr>
             <p:ph idx="1" type="body"/>
@@ -1590,7 +1590,7 @@
   <p:cSld>
     <p:spTree>
       <p:nvGrpSpPr>
-        <p:cNvPr id="86" name="Shape 86"/>
+        <p:cNvPr id="106" name="Shape 106"/>
         <p:cNvGrpSpPr/>
         <p:nvPr/>
       </p:nvGrpSpPr>
@@ -1604,7 +1604,7 @@
       </p:grpSpPr>
       <p:sp>
         <p:nvSpPr>
-          <p:cNvPr id="87" name="Google Shape;87;g4697239a74_0_300:notes"/>
+          <p:cNvPr id="107" name="Google Shape;107;g4697239a74_0_300:notes"/>
           <p:cNvSpPr/>
           <p:nvPr>
             <p:ph idx="2" type="sldImg"/>
@@ -1639,7 +1639,7 @@
       </p:sp>
       <p:sp>
         <p:nvSpPr>
-          <p:cNvPr id="88" name="Google Shape;88;g4697239a74_0_300:notes"/>
+          <p:cNvPr id="108" name="Google Shape;108;g4697239a74_0_300:notes"/>
           <p:cNvSpPr txBox="1"/>
           <p:nvPr>
             <p:ph idx="1" type="body"/>
@@ -1689,7 +1689,7 @@
   <p:cSld>
     <p:spTree>
       <p:nvGrpSpPr>
-        <p:cNvPr id="91" name="Shape 91"/>
+        <p:cNvPr id="111" name="Shape 111"/>
         <p:cNvGrpSpPr/>
         <p:nvPr/>
       </p:nvGrpSpPr>
@@ -1703,7 +1703,7 @@
       </p:grpSpPr>
       <p:sp>
         <p:nvSpPr>
-          <p:cNvPr id="92" name="Google Shape;92;g4697239a74_0_614:notes"/>
+          <p:cNvPr id="112" name="Google Shape;112;g4697239a74_0_614:notes"/>
           <p:cNvSpPr/>
           <p:nvPr>
             <p:ph idx="2" type="sldImg"/>
@@ -1738,7 +1738,7 @@
       </p:sp>
       <p:sp>
         <p:nvSpPr>
-          <p:cNvPr id="93" name="Google Shape;93;g4697239a74_0_614:notes"/>
+          <p:cNvPr id="113" name="Google Shape;113;g4697239a74_0_614:notes"/>
           <p:cNvSpPr txBox="1"/>
           <p:nvPr>
             <p:ph idx="1" type="body"/>
@@ -1834,16 +1834,9 @@
               <a:spcAft>
                 <a:spcPts val="0"/>
               </a:spcAft>
-              <a:buClr>
-                <a:srgbClr val="FF9900"/>
-              </a:buClr>
               <a:buSzPts val="2400"/>
               <a:buNone/>
-              <a:defRPr b="1" sz="2400">
-                <a:solidFill>
-                  <a:srgbClr val="FF9900"/>
-                </a:solidFill>
-              </a:defRPr>
+              <a:defRPr b="1" sz="2400"/>
             </a:lvl1pPr>
             <a:lvl2pPr lvl="1" rtl="0" algn="ctr">
               <a:spcBef>
@@ -2352,16 +2345,9 @@
               <a:spcAft>
                 <a:spcPts val="0"/>
               </a:spcAft>
-              <a:buClr>
-                <a:srgbClr val="FF9900"/>
-              </a:buClr>
               <a:buSzPts val="3600"/>
               <a:buNone/>
-              <a:defRPr sz="3600">
-                <a:solidFill>
-                  <a:srgbClr val="FF9900"/>
-                </a:solidFill>
-              </a:defRPr>
+              <a:defRPr sz="3600"/>
             </a:lvl1pPr>
             <a:lvl2pPr lvl="1" rtl="0" algn="ctr">
               <a:spcBef>
@@ -2819,7 +2805,7 @@
         </p:nvSpPr>
         <p:spPr>
           <a:xfrm>
-            <a:off x="8548658" y="4739417"/>
+            <a:off x="8548658" y="4796746"/>
             <a:ext cx="548700" cy="393600"/>
           </a:xfrm>
           <a:prstGeom prst="rect">
@@ -2922,6 +2908,136 @@
           </a:p>
         </p:txBody>
       </p:sp>
+      <p:sp>
+        <p:nvSpPr>
+          <p:cNvPr id="21" name="Google Shape;21;p4"/>
+          <p:cNvSpPr txBox="1"/>
+          <p:nvPr/>
+        </p:nvSpPr>
+        <p:spPr>
+          <a:xfrm>
+            <a:off x="3081450" y="4877896"/>
+            <a:ext cx="2981100" cy="231300"/>
+          </a:xfrm>
+          <a:prstGeom prst="rect">
+            <a:avLst/>
+          </a:prstGeom>
+          <a:noFill/>
+          <a:ln>
+            <a:noFill/>
+          </a:ln>
+        </p:spPr>
+        <p:txBody>
+          <a:bodyPr anchorCtr="0" anchor="ctr" bIns="91425" lIns="91425" spcFirstLastPara="1" rIns="91425" wrap="square" tIns="91425">
+            <a:noAutofit/>
+          </a:bodyPr>
+          <a:lstStyle/>
+          <a:p>
+            <a:pPr indent="0" lvl="0" marL="0" rtl="0" algn="ctr">
+              <a:spcBef>
+                <a:spcPts val="0"/>
+              </a:spcBef>
+              <a:spcAft>
+                <a:spcPts val="0"/>
+              </a:spcAft>
+              <a:buNone/>
+            </a:pPr>
+            <a:r>
+              <a:rPr lang="en" sz="1200">
+                <a:solidFill>
+                  <a:srgbClr val="FF8800"/>
+                </a:solidFill>
+              </a:rPr>
+              <a:t>BioHackathon Paris – 12/16 Nov 2018</a:t>
+            </a:r>
+            <a:endParaRPr sz="1200">
+              <a:solidFill>
+                <a:srgbClr val="FF8800"/>
+              </a:solidFill>
+            </a:endParaRPr>
+          </a:p>
+        </p:txBody>
+      </p:sp>
+      <p:pic>
+        <p:nvPicPr>
+          <p:cNvPr id="22" name="Google Shape;22;p4"/>
+          <p:cNvPicPr preferRelativeResize="0"/>
+          <p:nvPr/>
+        </p:nvPicPr>
+        <p:blipFill>
+          <a:blip r:embed="rId2">
+            <a:alphaModFix/>
+          </a:blip>
+          <a:stretch>
+            <a:fillRect/>
+          </a:stretch>
+        </p:blipFill>
+        <p:spPr>
+          <a:xfrm>
+            <a:off x="159575" y="4854058"/>
+            <a:ext cx="370725" cy="278975"/>
+          </a:xfrm>
+          <a:prstGeom prst="rect">
+            <a:avLst/>
+          </a:prstGeom>
+          <a:noFill/>
+          <a:ln>
+            <a:noFill/>
+          </a:ln>
+        </p:spPr>
+      </p:pic>
+      <p:cxnSp>
+        <p:nvCxnSpPr>
+          <p:cNvPr id="23" name="Google Shape;23;p4"/>
+          <p:cNvCxnSpPr/>
+          <p:nvPr/>
+        </p:nvCxnSpPr>
+        <p:spPr>
+          <a:xfrm>
+            <a:off x="7175" y="623450"/>
+            <a:ext cx="9144000" cy="0"/>
+          </a:xfrm>
+          <a:prstGeom prst="straightConnector1">
+            <a:avLst/>
+          </a:prstGeom>
+          <a:noFill/>
+          <a:ln cap="flat" cmpd="sng" w="9525">
+            <a:solidFill>
+              <a:srgbClr val="FF8800"/>
+            </a:solidFill>
+            <a:prstDash val="solid"/>
+            <a:round/>
+            <a:headEnd len="med" w="med" type="none"/>
+            <a:tailEnd len="med" w="med" type="none"/>
+          </a:ln>
+        </p:spPr>
+      </p:cxnSp>
+      <p:cxnSp>
+        <p:nvCxnSpPr>
+          <p:cNvPr id="24" name="Google Shape;24;p4"/>
+          <p:cNvCxnSpPr/>
+          <p:nvPr/>
+        </p:nvCxnSpPr>
+        <p:spPr>
+          <a:xfrm>
+            <a:off x="14250" y="4825450"/>
+            <a:ext cx="9144000" cy="0"/>
+          </a:xfrm>
+          <a:prstGeom prst="straightConnector1">
+            <a:avLst/>
+          </a:prstGeom>
+          <a:noFill/>
+          <a:ln cap="flat" cmpd="sng" w="9525">
+            <a:solidFill>
+              <a:srgbClr val="FF8800"/>
+            </a:solidFill>
+            <a:prstDash val="solid"/>
+            <a:round/>
+            <a:headEnd len="med" w="med" type="none"/>
+            <a:tailEnd len="med" w="med" type="none"/>
+          </a:ln>
+        </p:spPr>
+      </p:cxnSp>
     </p:spTree>
   </p:cSld>
   <p:clrMapOvr>
@@ -2935,7 +3051,7 @@
   <p:cSld name="TITLE_AND_TWO_COLUMNS">
     <p:spTree>
       <p:nvGrpSpPr>
-        <p:cNvPr id="21" name="Shape 21"/>
+        <p:cNvPr id="25" name="Shape 25"/>
         <p:cNvGrpSpPr/>
         <p:nvPr/>
       </p:nvGrpSpPr>
@@ -2949,7 +3065,7 @@
       </p:grpSpPr>
       <p:sp>
         <p:nvSpPr>
-          <p:cNvPr id="22" name="Google Shape;22;p5"/>
+          <p:cNvPr id="26" name="Google Shape;26;p5"/>
           <p:cNvSpPr txBox="1"/>
           <p:nvPr>
             <p:ph type="title"/>
@@ -3072,7 +3188,7 @@
       </p:sp>
       <p:sp>
         <p:nvSpPr>
-          <p:cNvPr id="23" name="Google Shape;23;p5"/>
+          <p:cNvPr id="27" name="Google Shape;27;p5"/>
           <p:cNvSpPr txBox="1"/>
           <p:nvPr>
             <p:ph idx="1" type="body"/>
@@ -3222,7 +3338,7 @@
       </p:sp>
       <p:sp>
         <p:nvSpPr>
-          <p:cNvPr id="24" name="Google Shape;24;p5"/>
+          <p:cNvPr id="28" name="Google Shape;28;p5"/>
           <p:cNvSpPr txBox="1"/>
           <p:nvPr>
             <p:ph idx="2" type="body"/>
@@ -3372,7 +3488,7 @@
       </p:sp>
       <p:sp>
         <p:nvSpPr>
-          <p:cNvPr id="25" name="Google Shape;25;p5"/>
+          <p:cNvPr id="29" name="Google Shape;29;p5"/>
           <p:cNvSpPr txBox="1"/>
           <p:nvPr>
             <p:ph idx="12" type="sldNum"/>
@@ -3380,7 +3496,7 @@
         </p:nvSpPr>
         <p:spPr>
           <a:xfrm>
-            <a:off x="8548658" y="4739417"/>
+            <a:off x="8548658" y="4796746"/>
             <a:ext cx="548700" cy="393600"/>
           </a:xfrm>
           <a:prstGeom prst="rect">
@@ -3447,6 +3563,136 @@
           </a:p>
         </p:txBody>
       </p:sp>
+      <p:sp>
+        <p:nvSpPr>
+          <p:cNvPr id="30" name="Google Shape;30;p5"/>
+          <p:cNvSpPr txBox="1"/>
+          <p:nvPr/>
+        </p:nvSpPr>
+        <p:spPr>
+          <a:xfrm>
+            <a:off x="3081450" y="4877896"/>
+            <a:ext cx="2981100" cy="231300"/>
+          </a:xfrm>
+          <a:prstGeom prst="rect">
+            <a:avLst/>
+          </a:prstGeom>
+          <a:noFill/>
+          <a:ln>
+            <a:noFill/>
+          </a:ln>
+        </p:spPr>
+        <p:txBody>
+          <a:bodyPr anchorCtr="0" anchor="ctr" bIns="91425" lIns="91425" spcFirstLastPara="1" rIns="91425" wrap="square" tIns="91425">
+            <a:noAutofit/>
+          </a:bodyPr>
+          <a:lstStyle/>
+          <a:p>
+            <a:pPr indent="0" lvl="0" marL="0" rtl="0" algn="ctr">
+              <a:spcBef>
+                <a:spcPts val="0"/>
+              </a:spcBef>
+              <a:spcAft>
+                <a:spcPts val="0"/>
+              </a:spcAft>
+              <a:buNone/>
+            </a:pPr>
+            <a:r>
+              <a:rPr lang="en" sz="1200">
+                <a:solidFill>
+                  <a:srgbClr val="FF8800"/>
+                </a:solidFill>
+              </a:rPr>
+              <a:t>BioHackathon Paris – 12/16 Nov 2018</a:t>
+            </a:r>
+            <a:endParaRPr sz="1200">
+              <a:solidFill>
+                <a:srgbClr val="FF8800"/>
+              </a:solidFill>
+            </a:endParaRPr>
+          </a:p>
+        </p:txBody>
+      </p:sp>
+      <p:pic>
+        <p:nvPicPr>
+          <p:cNvPr id="31" name="Google Shape;31;p5"/>
+          <p:cNvPicPr preferRelativeResize="0"/>
+          <p:nvPr/>
+        </p:nvPicPr>
+        <p:blipFill>
+          <a:blip r:embed="rId2">
+            <a:alphaModFix/>
+          </a:blip>
+          <a:stretch>
+            <a:fillRect/>
+          </a:stretch>
+        </p:blipFill>
+        <p:spPr>
+          <a:xfrm>
+            <a:off x="159575" y="4854058"/>
+            <a:ext cx="370725" cy="278975"/>
+          </a:xfrm>
+          <a:prstGeom prst="rect">
+            <a:avLst/>
+          </a:prstGeom>
+          <a:noFill/>
+          <a:ln>
+            <a:noFill/>
+          </a:ln>
+        </p:spPr>
+      </p:pic>
+      <p:cxnSp>
+        <p:nvCxnSpPr>
+          <p:cNvPr id="32" name="Google Shape;32;p5"/>
+          <p:cNvCxnSpPr/>
+          <p:nvPr/>
+        </p:nvCxnSpPr>
+        <p:spPr>
+          <a:xfrm>
+            <a:off x="7175" y="623450"/>
+            <a:ext cx="9144000" cy="0"/>
+          </a:xfrm>
+          <a:prstGeom prst="straightConnector1">
+            <a:avLst/>
+          </a:prstGeom>
+          <a:noFill/>
+          <a:ln cap="flat" cmpd="sng" w="9525">
+            <a:solidFill>
+              <a:srgbClr val="FF8800"/>
+            </a:solidFill>
+            <a:prstDash val="solid"/>
+            <a:round/>
+            <a:headEnd len="med" w="med" type="none"/>
+            <a:tailEnd len="med" w="med" type="none"/>
+          </a:ln>
+        </p:spPr>
+      </p:cxnSp>
+      <p:cxnSp>
+        <p:nvCxnSpPr>
+          <p:cNvPr id="33" name="Google Shape;33;p5"/>
+          <p:cNvCxnSpPr/>
+          <p:nvPr/>
+        </p:nvCxnSpPr>
+        <p:spPr>
+          <a:xfrm>
+            <a:off x="14250" y="4825450"/>
+            <a:ext cx="9144000" cy="0"/>
+          </a:xfrm>
+          <a:prstGeom prst="straightConnector1">
+            <a:avLst/>
+          </a:prstGeom>
+          <a:noFill/>
+          <a:ln cap="flat" cmpd="sng" w="9525">
+            <a:solidFill>
+              <a:srgbClr val="FF8800"/>
+            </a:solidFill>
+            <a:prstDash val="solid"/>
+            <a:round/>
+            <a:headEnd len="med" w="med" type="none"/>
+            <a:tailEnd len="med" w="med" type="none"/>
+          </a:ln>
+        </p:spPr>
+      </p:cxnSp>
     </p:spTree>
   </p:cSld>
   <p:clrMapOvr>
@@ -3458,756 +3704,6 @@
 <file path=ppt/slideLayouts/slideLayout5.xml><?xml version="1.0" encoding="utf-8"?>
 <p:sldLayout xmlns:a="http://schemas.openxmlformats.org/drawingml/2006/main" xmlns:r="http://schemas.openxmlformats.org/officeDocument/2006/relationships" xmlns:mc="http://schemas.openxmlformats.org/markup-compatibility/2006" xmlns:mv="urn:schemas-microsoft-com:mac:vml" xmlns:p="http://schemas.openxmlformats.org/presentationml/2006/main" xmlns:c="http://schemas.openxmlformats.org/drawingml/2006/chart" xmlns:dgm="http://schemas.openxmlformats.org/drawingml/2006/diagram" xmlns:o="urn:schemas-microsoft-com:office:office" xmlns:v="urn:schemas-microsoft-com:vml" xmlns:pvml="urn:schemas-microsoft-com:office:powerpoint" xmlns:com="http://schemas.openxmlformats.org/drawingml/2006/compatibility" xmlns:p14="http://schemas.microsoft.com/office/powerpoint/2010/main" xmlns:p15="http://schemas.microsoft.com/office/powerpoint/2012/main" matchingName="Title and right column">
   <p:cSld name="TITLE_AND_TWO_COLUMNS_2">
-    <p:spTree>
-      <p:nvGrpSpPr>
-        <p:cNvPr id="26" name="Shape 26"/>
-        <p:cNvGrpSpPr/>
-        <p:nvPr/>
-      </p:nvGrpSpPr>
-      <p:grpSpPr>
-        <a:xfrm>
-          <a:off x="0" y="0"/>
-          <a:ext cx="0" cy="0"/>
-          <a:chOff x="0" y="0"/>
-          <a:chExt cx="0" cy="0"/>
-        </a:xfrm>
-      </p:grpSpPr>
-      <p:sp>
-        <p:nvSpPr>
-          <p:cNvPr id="27" name="Google Shape;27;p6"/>
-          <p:cNvSpPr txBox="1"/>
-          <p:nvPr>
-            <p:ph type="title"/>
-          </p:nvPr>
-        </p:nvSpPr>
-        <p:spPr>
-          <a:xfrm>
-            <a:off x="311700" y="67550"/>
-            <a:ext cx="8520600" cy="572700"/>
-          </a:xfrm>
-          <a:prstGeom prst="rect">
-            <a:avLst/>
-          </a:prstGeom>
-        </p:spPr>
-        <p:txBody>
-          <a:bodyPr anchorCtr="0" anchor="t" bIns="91425" lIns="91425" spcFirstLastPara="1" rIns="91425" wrap="square" tIns="91425"/>
-          <a:lstStyle>
-            <a:lvl1pPr lvl="0" rtl="0">
-              <a:spcBef>
-                <a:spcPts val="0"/>
-              </a:spcBef>
-              <a:spcAft>
-                <a:spcPts val="0"/>
-              </a:spcAft>
-              <a:buSzPts val="2800"/>
-              <a:buNone/>
-              <a:defRPr/>
-            </a:lvl1pPr>
-            <a:lvl2pPr lvl="1" rtl="0">
-              <a:spcBef>
-                <a:spcPts val="0"/>
-              </a:spcBef>
-              <a:spcAft>
-                <a:spcPts val="0"/>
-              </a:spcAft>
-              <a:buSzPts val="2800"/>
-              <a:buNone/>
-              <a:defRPr/>
-            </a:lvl2pPr>
-            <a:lvl3pPr lvl="2" rtl="0">
-              <a:spcBef>
-                <a:spcPts val="0"/>
-              </a:spcBef>
-              <a:spcAft>
-                <a:spcPts val="0"/>
-              </a:spcAft>
-              <a:buSzPts val="2800"/>
-              <a:buNone/>
-              <a:defRPr/>
-            </a:lvl3pPr>
-            <a:lvl4pPr lvl="3" rtl="0">
-              <a:spcBef>
-                <a:spcPts val="0"/>
-              </a:spcBef>
-              <a:spcAft>
-                <a:spcPts val="0"/>
-              </a:spcAft>
-              <a:buSzPts val="2800"/>
-              <a:buNone/>
-              <a:defRPr/>
-            </a:lvl4pPr>
-            <a:lvl5pPr lvl="4" rtl="0">
-              <a:spcBef>
-                <a:spcPts val="0"/>
-              </a:spcBef>
-              <a:spcAft>
-                <a:spcPts val="0"/>
-              </a:spcAft>
-              <a:buSzPts val="2800"/>
-              <a:buNone/>
-              <a:defRPr/>
-            </a:lvl5pPr>
-            <a:lvl6pPr lvl="5" rtl="0">
-              <a:spcBef>
-                <a:spcPts val="0"/>
-              </a:spcBef>
-              <a:spcAft>
-                <a:spcPts val="0"/>
-              </a:spcAft>
-              <a:buSzPts val="2800"/>
-              <a:buNone/>
-              <a:defRPr/>
-            </a:lvl6pPr>
-            <a:lvl7pPr lvl="6" rtl="0">
-              <a:spcBef>
-                <a:spcPts val="0"/>
-              </a:spcBef>
-              <a:spcAft>
-                <a:spcPts val="0"/>
-              </a:spcAft>
-              <a:buSzPts val="2800"/>
-              <a:buNone/>
-              <a:defRPr/>
-            </a:lvl7pPr>
-            <a:lvl8pPr lvl="7" rtl="0">
-              <a:spcBef>
-                <a:spcPts val="0"/>
-              </a:spcBef>
-              <a:spcAft>
-                <a:spcPts val="0"/>
-              </a:spcAft>
-              <a:buSzPts val="2800"/>
-              <a:buNone/>
-              <a:defRPr/>
-            </a:lvl8pPr>
-            <a:lvl9pPr lvl="8" rtl="0">
-              <a:spcBef>
-                <a:spcPts val="0"/>
-              </a:spcBef>
-              <a:spcAft>
-                <a:spcPts val="0"/>
-              </a:spcAft>
-              <a:buSzPts val="2800"/>
-              <a:buNone/>
-              <a:defRPr/>
-            </a:lvl9pPr>
-          </a:lstStyle>
-          <a:p/>
-        </p:txBody>
-      </p:sp>
-      <p:sp>
-        <p:nvSpPr>
-          <p:cNvPr id="28" name="Google Shape;28;p6"/>
-          <p:cNvSpPr txBox="1"/>
-          <p:nvPr>
-            <p:ph idx="1" type="body"/>
-          </p:nvPr>
-        </p:nvSpPr>
-        <p:spPr>
-          <a:xfrm>
-            <a:off x="4832400" y="695275"/>
-            <a:ext cx="3999900" cy="4044000"/>
-          </a:xfrm>
-          <a:prstGeom prst="rect">
-            <a:avLst/>
-          </a:prstGeom>
-        </p:spPr>
-        <p:txBody>
-          <a:bodyPr anchorCtr="0" anchor="t" bIns="91425" lIns="91425" spcFirstLastPara="1" rIns="91425" wrap="square" tIns="91425"/>
-          <a:lstStyle>
-            <a:lvl1pPr indent="-317500" lvl="0" marL="457200" rtl="0">
-              <a:lnSpc>
-                <a:spcPct val="115000"/>
-              </a:lnSpc>
-              <a:spcBef>
-                <a:spcPts val="0"/>
-              </a:spcBef>
-              <a:spcAft>
-                <a:spcPts val="0"/>
-              </a:spcAft>
-              <a:buSzPts val="1400"/>
-              <a:buChar char="●"/>
-              <a:defRPr sz="1400"/>
-            </a:lvl1pPr>
-            <a:lvl2pPr indent="-304800" lvl="1" marL="914400" rtl="0">
-              <a:lnSpc>
-                <a:spcPct val="115000"/>
-              </a:lnSpc>
-              <a:spcBef>
-                <a:spcPts val="1200"/>
-              </a:spcBef>
-              <a:spcAft>
-                <a:spcPts val="0"/>
-              </a:spcAft>
-              <a:buSzPts val="1200"/>
-              <a:buChar char="○"/>
-              <a:defRPr sz="1200"/>
-            </a:lvl2pPr>
-            <a:lvl3pPr indent="-304800" lvl="2" marL="1371600" rtl="0">
-              <a:lnSpc>
-                <a:spcPct val="115000"/>
-              </a:lnSpc>
-              <a:spcBef>
-                <a:spcPts val="1200"/>
-              </a:spcBef>
-              <a:spcAft>
-                <a:spcPts val="0"/>
-              </a:spcAft>
-              <a:buSzPts val="1200"/>
-              <a:buChar char="■"/>
-              <a:defRPr sz="1200"/>
-            </a:lvl3pPr>
-            <a:lvl4pPr indent="-304800" lvl="3" marL="1828800" rtl="0">
-              <a:lnSpc>
-                <a:spcPct val="115000"/>
-              </a:lnSpc>
-              <a:spcBef>
-                <a:spcPts val="1200"/>
-              </a:spcBef>
-              <a:spcAft>
-                <a:spcPts val="0"/>
-              </a:spcAft>
-              <a:buSzPts val="1200"/>
-              <a:buChar char="●"/>
-              <a:defRPr sz="1200"/>
-            </a:lvl4pPr>
-            <a:lvl5pPr indent="-304800" lvl="4" marL="2286000" rtl="0">
-              <a:lnSpc>
-                <a:spcPct val="115000"/>
-              </a:lnSpc>
-              <a:spcBef>
-                <a:spcPts val="1200"/>
-              </a:spcBef>
-              <a:spcAft>
-                <a:spcPts val="0"/>
-              </a:spcAft>
-              <a:buSzPts val="1200"/>
-              <a:buChar char="○"/>
-              <a:defRPr sz="1200"/>
-            </a:lvl5pPr>
-            <a:lvl6pPr indent="-304800" lvl="5" marL="2743200" rtl="0">
-              <a:lnSpc>
-                <a:spcPct val="115000"/>
-              </a:lnSpc>
-              <a:spcBef>
-                <a:spcPts val="1200"/>
-              </a:spcBef>
-              <a:spcAft>
-                <a:spcPts val="0"/>
-              </a:spcAft>
-              <a:buSzPts val="1200"/>
-              <a:buChar char="■"/>
-              <a:defRPr sz="1200"/>
-            </a:lvl6pPr>
-            <a:lvl7pPr indent="-304800" lvl="6" marL="3200400" rtl="0">
-              <a:lnSpc>
-                <a:spcPct val="115000"/>
-              </a:lnSpc>
-              <a:spcBef>
-                <a:spcPts val="1200"/>
-              </a:spcBef>
-              <a:spcAft>
-                <a:spcPts val="0"/>
-              </a:spcAft>
-              <a:buSzPts val="1200"/>
-              <a:buChar char="●"/>
-              <a:defRPr sz="1200"/>
-            </a:lvl7pPr>
-            <a:lvl8pPr indent="-304800" lvl="7" marL="3657600" rtl="0">
-              <a:lnSpc>
-                <a:spcPct val="115000"/>
-              </a:lnSpc>
-              <a:spcBef>
-                <a:spcPts val="1200"/>
-              </a:spcBef>
-              <a:spcAft>
-                <a:spcPts val="0"/>
-              </a:spcAft>
-              <a:buSzPts val="1200"/>
-              <a:buChar char="○"/>
-              <a:defRPr sz="1200"/>
-            </a:lvl8pPr>
-            <a:lvl9pPr indent="-304800" lvl="8" marL="4114800" rtl="0">
-              <a:lnSpc>
-                <a:spcPct val="115000"/>
-              </a:lnSpc>
-              <a:spcBef>
-                <a:spcPts val="1200"/>
-              </a:spcBef>
-              <a:spcAft>
-                <a:spcPts val="1200"/>
-              </a:spcAft>
-              <a:buSzPts val="1200"/>
-              <a:buChar char="■"/>
-              <a:defRPr sz="1200"/>
-            </a:lvl9pPr>
-          </a:lstStyle>
-          <a:p/>
-        </p:txBody>
-      </p:sp>
-      <p:sp>
-        <p:nvSpPr>
-          <p:cNvPr id="29" name="Google Shape;29;p6"/>
-          <p:cNvSpPr txBox="1"/>
-          <p:nvPr>
-            <p:ph idx="12" type="sldNum"/>
-          </p:nvPr>
-        </p:nvSpPr>
-        <p:spPr>
-          <a:xfrm>
-            <a:off x="8548658" y="4739417"/>
-            <a:ext cx="548700" cy="393600"/>
-          </a:xfrm>
-          <a:prstGeom prst="rect">
-            <a:avLst/>
-          </a:prstGeom>
-        </p:spPr>
-        <p:txBody>
-          <a:bodyPr anchorCtr="0" anchor="b" bIns="91425" lIns="91425" spcFirstLastPara="1" rIns="91425" wrap="square" tIns="91425">
-            <a:noAutofit/>
-          </a:bodyPr>
-          <a:lstStyle>
-            <a:lvl1pPr lvl="0" rtl="0">
-              <a:buNone/>
-              <a:defRPr/>
-            </a:lvl1pPr>
-            <a:lvl2pPr lvl="1" rtl="0">
-              <a:buNone/>
-              <a:defRPr/>
-            </a:lvl2pPr>
-            <a:lvl3pPr lvl="2" rtl="0">
-              <a:buNone/>
-              <a:defRPr/>
-            </a:lvl3pPr>
-            <a:lvl4pPr lvl="3" rtl="0">
-              <a:buNone/>
-              <a:defRPr/>
-            </a:lvl4pPr>
-            <a:lvl5pPr lvl="4" rtl="0">
-              <a:buNone/>
-              <a:defRPr/>
-            </a:lvl5pPr>
-            <a:lvl6pPr lvl="5" rtl="0">
-              <a:buNone/>
-              <a:defRPr/>
-            </a:lvl6pPr>
-            <a:lvl7pPr lvl="6" rtl="0">
-              <a:buNone/>
-              <a:defRPr/>
-            </a:lvl7pPr>
-            <a:lvl8pPr lvl="7" rtl="0">
-              <a:buNone/>
-              <a:defRPr/>
-            </a:lvl8pPr>
-            <a:lvl9pPr lvl="8" rtl="0">
-              <a:buNone/>
-              <a:defRPr/>
-            </a:lvl9pPr>
-          </a:lstStyle>
-          <a:p>
-            <a:pPr indent="0" lvl="0" marL="0" rtl="0" algn="r">
-              <a:spcBef>
-                <a:spcPts val="0"/>
-              </a:spcBef>
-              <a:spcAft>
-                <a:spcPts val="0"/>
-              </a:spcAft>
-              <a:buNone/>
-            </a:pPr>
-            <a:fld id="{00000000-1234-1234-1234-123412341234}" type="slidenum">
-              <a:rPr lang="en"/>
-              <a:t>‹#›</a:t>
-            </a:fld>
-            <a:endParaRPr/>
-          </a:p>
-        </p:txBody>
-      </p:sp>
-    </p:spTree>
-  </p:cSld>
-  <p:clrMapOvr>
-    <a:masterClrMapping/>
-  </p:clrMapOvr>
-</p:sldLayout>
-</file>
-
-<file path=ppt/slideLayouts/slideLayout6.xml><?xml version="1.0" encoding="utf-8"?>
-<p:sldLayout xmlns:a="http://schemas.openxmlformats.org/drawingml/2006/main" xmlns:r="http://schemas.openxmlformats.org/officeDocument/2006/relationships" xmlns:mc="http://schemas.openxmlformats.org/markup-compatibility/2006" xmlns:mv="urn:schemas-microsoft-com:mac:vml" xmlns:p="http://schemas.openxmlformats.org/presentationml/2006/main" xmlns:c="http://schemas.openxmlformats.org/drawingml/2006/chart" xmlns:dgm="http://schemas.openxmlformats.org/drawingml/2006/diagram" xmlns:o="urn:schemas-microsoft-com:office:office" xmlns:v="urn:schemas-microsoft-com:vml" xmlns:pvml="urn:schemas-microsoft-com:office:powerpoint" xmlns:com="http://schemas.openxmlformats.org/drawingml/2006/compatibility" xmlns:p14="http://schemas.microsoft.com/office/powerpoint/2010/main" xmlns:p15="http://schemas.microsoft.com/office/powerpoint/2012/main" matchingName="Title and left column">
-  <p:cSld name="TITLE_AND_TWO_COLUMNS_1">
-    <p:spTree>
-      <p:nvGrpSpPr>
-        <p:cNvPr id="30" name="Shape 30"/>
-        <p:cNvGrpSpPr/>
-        <p:nvPr/>
-      </p:nvGrpSpPr>
-      <p:grpSpPr>
-        <a:xfrm>
-          <a:off x="0" y="0"/>
-          <a:ext cx="0" cy="0"/>
-          <a:chOff x="0" y="0"/>
-          <a:chExt cx="0" cy="0"/>
-        </a:xfrm>
-      </p:grpSpPr>
-      <p:sp>
-        <p:nvSpPr>
-          <p:cNvPr id="31" name="Google Shape;31;p7"/>
-          <p:cNvSpPr txBox="1"/>
-          <p:nvPr>
-            <p:ph type="title"/>
-          </p:nvPr>
-        </p:nvSpPr>
-        <p:spPr>
-          <a:xfrm>
-            <a:off x="311700" y="67550"/>
-            <a:ext cx="8520600" cy="572700"/>
-          </a:xfrm>
-          <a:prstGeom prst="rect">
-            <a:avLst/>
-          </a:prstGeom>
-        </p:spPr>
-        <p:txBody>
-          <a:bodyPr anchorCtr="0" anchor="t" bIns="91425" lIns="91425" spcFirstLastPara="1" rIns="91425" wrap="square" tIns="91425"/>
-          <a:lstStyle>
-            <a:lvl1pPr lvl="0" rtl="0">
-              <a:spcBef>
-                <a:spcPts val="0"/>
-              </a:spcBef>
-              <a:spcAft>
-                <a:spcPts val="0"/>
-              </a:spcAft>
-              <a:buSzPts val="2800"/>
-              <a:buNone/>
-              <a:defRPr/>
-            </a:lvl1pPr>
-            <a:lvl2pPr lvl="1" rtl="0">
-              <a:spcBef>
-                <a:spcPts val="0"/>
-              </a:spcBef>
-              <a:spcAft>
-                <a:spcPts val="0"/>
-              </a:spcAft>
-              <a:buSzPts val="2800"/>
-              <a:buNone/>
-              <a:defRPr/>
-            </a:lvl2pPr>
-            <a:lvl3pPr lvl="2" rtl="0">
-              <a:spcBef>
-                <a:spcPts val="0"/>
-              </a:spcBef>
-              <a:spcAft>
-                <a:spcPts val="0"/>
-              </a:spcAft>
-              <a:buSzPts val="2800"/>
-              <a:buNone/>
-              <a:defRPr/>
-            </a:lvl3pPr>
-            <a:lvl4pPr lvl="3" rtl="0">
-              <a:spcBef>
-                <a:spcPts val="0"/>
-              </a:spcBef>
-              <a:spcAft>
-                <a:spcPts val="0"/>
-              </a:spcAft>
-              <a:buSzPts val="2800"/>
-              <a:buNone/>
-              <a:defRPr/>
-            </a:lvl4pPr>
-            <a:lvl5pPr lvl="4" rtl="0">
-              <a:spcBef>
-                <a:spcPts val="0"/>
-              </a:spcBef>
-              <a:spcAft>
-                <a:spcPts val="0"/>
-              </a:spcAft>
-              <a:buSzPts val="2800"/>
-              <a:buNone/>
-              <a:defRPr/>
-            </a:lvl5pPr>
-            <a:lvl6pPr lvl="5" rtl="0">
-              <a:spcBef>
-                <a:spcPts val="0"/>
-              </a:spcBef>
-              <a:spcAft>
-                <a:spcPts val="0"/>
-              </a:spcAft>
-              <a:buSzPts val="2800"/>
-              <a:buNone/>
-              <a:defRPr/>
-            </a:lvl6pPr>
-            <a:lvl7pPr lvl="6" rtl="0">
-              <a:spcBef>
-                <a:spcPts val="0"/>
-              </a:spcBef>
-              <a:spcAft>
-                <a:spcPts val="0"/>
-              </a:spcAft>
-              <a:buSzPts val="2800"/>
-              <a:buNone/>
-              <a:defRPr/>
-            </a:lvl7pPr>
-            <a:lvl8pPr lvl="7" rtl="0">
-              <a:spcBef>
-                <a:spcPts val="0"/>
-              </a:spcBef>
-              <a:spcAft>
-                <a:spcPts val="0"/>
-              </a:spcAft>
-              <a:buSzPts val="2800"/>
-              <a:buNone/>
-              <a:defRPr/>
-            </a:lvl8pPr>
-            <a:lvl9pPr lvl="8" rtl="0">
-              <a:spcBef>
-                <a:spcPts val="0"/>
-              </a:spcBef>
-              <a:spcAft>
-                <a:spcPts val="0"/>
-              </a:spcAft>
-              <a:buSzPts val="2800"/>
-              <a:buNone/>
-              <a:defRPr/>
-            </a:lvl9pPr>
-          </a:lstStyle>
-          <a:p/>
-        </p:txBody>
-      </p:sp>
-      <p:sp>
-        <p:nvSpPr>
-          <p:cNvPr id="32" name="Google Shape;32;p7"/>
-          <p:cNvSpPr txBox="1"/>
-          <p:nvPr>
-            <p:ph idx="1" type="body"/>
-          </p:nvPr>
-        </p:nvSpPr>
-        <p:spPr>
-          <a:xfrm>
-            <a:off x="311700" y="695275"/>
-            <a:ext cx="3999900" cy="4044000"/>
-          </a:xfrm>
-          <a:prstGeom prst="rect">
-            <a:avLst/>
-          </a:prstGeom>
-        </p:spPr>
-        <p:txBody>
-          <a:bodyPr anchorCtr="0" anchor="t" bIns="91425" lIns="91425" spcFirstLastPara="1" rIns="91425" wrap="square" tIns="91425"/>
-          <a:lstStyle>
-            <a:lvl1pPr indent="-317500" lvl="0" marL="457200" rtl="0">
-              <a:lnSpc>
-                <a:spcPct val="115000"/>
-              </a:lnSpc>
-              <a:spcBef>
-                <a:spcPts val="0"/>
-              </a:spcBef>
-              <a:spcAft>
-                <a:spcPts val="0"/>
-              </a:spcAft>
-              <a:buSzPts val="1400"/>
-              <a:buChar char="●"/>
-              <a:defRPr sz="1400"/>
-            </a:lvl1pPr>
-            <a:lvl2pPr indent="-304800" lvl="1" marL="914400" rtl="0">
-              <a:lnSpc>
-                <a:spcPct val="115000"/>
-              </a:lnSpc>
-              <a:spcBef>
-                <a:spcPts val="1200"/>
-              </a:spcBef>
-              <a:spcAft>
-                <a:spcPts val="0"/>
-              </a:spcAft>
-              <a:buSzPts val="1200"/>
-              <a:buChar char="○"/>
-              <a:defRPr sz="1200"/>
-            </a:lvl2pPr>
-            <a:lvl3pPr indent="-304800" lvl="2" marL="1371600" rtl="0">
-              <a:lnSpc>
-                <a:spcPct val="115000"/>
-              </a:lnSpc>
-              <a:spcBef>
-                <a:spcPts val="1200"/>
-              </a:spcBef>
-              <a:spcAft>
-                <a:spcPts val="0"/>
-              </a:spcAft>
-              <a:buSzPts val="1200"/>
-              <a:buChar char="■"/>
-              <a:defRPr sz="1200"/>
-            </a:lvl3pPr>
-            <a:lvl4pPr indent="-304800" lvl="3" marL="1828800" rtl="0">
-              <a:lnSpc>
-                <a:spcPct val="115000"/>
-              </a:lnSpc>
-              <a:spcBef>
-                <a:spcPts val="1200"/>
-              </a:spcBef>
-              <a:spcAft>
-                <a:spcPts val="0"/>
-              </a:spcAft>
-              <a:buSzPts val="1200"/>
-              <a:buChar char="●"/>
-              <a:defRPr sz="1200"/>
-            </a:lvl4pPr>
-            <a:lvl5pPr indent="-304800" lvl="4" marL="2286000" rtl="0">
-              <a:lnSpc>
-                <a:spcPct val="115000"/>
-              </a:lnSpc>
-              <a:spcBef>
-                <a:spcPts val="1200"/>
-              </a:spcBef>
-              <a:spcAft>
-                <a:spcPts val="0"/>
-              </a:spcAft>
-              <a:buSzPts val="1200"/>
-              <a:buChar char="○"/>
-              <a:defRPr sz="1200"/>
-            </a:lvl5pPr>
-            <a:lvl6pPr indent="-304800" lvl="5" marL="2743200" rtl="0">
-              <a:lnSpc>
-                <a:spcPct val="115000"/>
-              </a:lnSpc>
-              <a:spcBef>
-                <a:spcPts val="1200"/>
-              </a:spcBef>
-              <a:spcAft>
-                <a:spcPts val="0"/>
-              </a:spcAft>
-              <a:buSzPts val="1200"/>
-              <a:buChar char="■"/>
-              <a:defRPr sz="1200"/>
-            </a:lvl6pPr>
-            <a:lvl7pPr indent="-304800" lvl="6" marL="3200400" rtl="0">
-              <a:lnSpc>
-                <a:spcPct val="115000"/>
-              </a:lnSpc>
-              <a:spcBef>
-                <a:spcPts val="1200"/>
-              </a:spcBef>
-              <a:spcAft>
-                <a:spcPts val="0"/>
-              </a:spcAft>
-              <a:buSzPts val="1200"/>
-              <a:buChar char="●"/>
-              <a:defRPr sz="1200"/>
-            </a:lvl7pPr>
-            <a:lvl8pPr indent="-304800" lvl="7" marL="3657600" rtl="0">
-              <a:lnSpc>
-                <a:spcPct val="115000"/>
-              </a:lnSpc>
-              <a:spcBef>
-                <a:spcPts val="1200"/>
-              </a:spcBef>
-              <a:spcAft>
-                <a:spcPts val="0"/>
-              </a:spcAft>
-              <a:buSzPts val="1200"/>
-              <a:buChar char="○"/>
-              <a:defRPr sz="1200"/>
-            </a:lvl8pPr>
-            <a:lvl9pPr indent="-304800" lvl="8" marL="4114800" rtl="0">
-              <a:lnSpc>
-                <a:spcPct val="115000"/>
-              </a:lnSpc>
-              <a:spcBef>
-                <a:spcPts val="1200"/>
-              </a:spcBef>
-              <a:spcAft>
-                <a:spcPts val="1200"/>
-              </a:spcAft>
-              <a:buSzPts val="1200"/>
-              <a:buChar char="■"/>
-              <a:defRPr sz="1200"/>
-            </a:lvl9pPr>
-          </a:lstStyle>
-          <a:p/>
-        </p:txBody>
-      </p:sp>
-      <p:sp>
-        <p:nvSpPr>
-          <p:cNvPr id="33" name="Google Shape;33;p7"/>
-          <p:cNvSpPr txBox="1"/>
-          <p:nvPr>
-            <p:ph idx="12" type="sldNum"/>
-          </p:nvPr>
-        </p:nvSpPr>
-        <p:spPr>
-          <a:xfrm>
-            <a:off x="8548658" y="4739417"/>
-            <a:ext cx="548700" cy="393600"/>
-          </a:xfrm>
-          <a:prstGeom prst="rect">
-            <a:avLst/>
-          </a:prstGeom>
-        </p:spPr>
-        <p:txBody>
-          <a:bodyPr anchorCtr="0" anchor="b" bIns="91425" lIns="91425" spcFirstLastPara="1" rIns="91425" wrap="square" tIns="91425">
-            <a:noAutofit/>
-          </a:bodyPr>
-          <a:lstStyle>
-            <a:lvl1pPr lvl="0" rtl="0">
-              <a:buNone/>
-              <a:defRPr/>
-            </a:lvl1pPr>
-            <a:lvl2pPr lvl="1" rtl="0">
-              <a:buNone/>
-              <a:defRPr/>
-            </a:lvl2pPr>
-            <a:lvl3pPr lvl="2" rtl="0">
-              <a:buNone/>
-              <a:defRPr/>
-            </a:lvl3pPr>
-            <a:lvl4pPr lvl="3" rtl="0">
-              <a:buNone/>
-              <a:defRPr/>
-            </a:lvl4pPr>
-            <a:lvl5pPr lvl="4" rtl="0">
-              <a:buNone/>
-              <a:defRPr/>
-            </a:lvl5pPr>
-            <a:lvl6pPr lvl="5" rtl="0">
-              <a:buNone/>
-              <a:defRPr/>
-            </a:lvl6pPr>
-            <a:lvl7pPr lvl="6" rtl="0">
-              <a:buNone/>
-              <a:defRPr/>
-            </a:lvl7pPr>
-            <a:lvl8pPr lvl="7" rtl="0">
-              <a:buNone/>
-              <a:defRPr/>
-            </a:lvl8pPr>
-            <a:lvl9pPr lvl="8" rtl="0">
-              <a:buNone/>
-              <a:defRPr/>
-            </a:lvl9pPr>
-          </a:lstStyle>
-          <a:p>
-            <a:pPr indent="0" lvl="0" marL="0" rtl="0" algn="r">
-              <a:spcBef>
-                <a:spcPts val="0"/>
-              </a:spcBef>
-              <a:spcAft>
-                <a:spcPts val="0"/>
-              </a:spcAft>
-              <a:buNone/>
-            </a:pPr>
-            <a:fld id="{00000000-1234-1234-1234-123412341234}" type="slidenum">
-              <a:rPr lang="en"/>
-              <a:t>‹#›</a:t>
-            </a:fld>
-            <a:endParaRPr/>
-          </a:p>
-        </p:txBody>
-      </p:sp>
-    </p:spTree>
-  </p:cSld>
-  <p:clrMapOvr>
-    <a:masterClrMapping/>
-  </p:clrMapOvr>
-</p:sldLayout>
-</file>
-
-<file path=ppt/slideLayouts/slideLayout7.xml><?xml version="1.0" encoding="utf-8"?>
-<p:sldLayout xmlns:a="http://schemas.openxmlformats.org/drawingml/2006/main" xmlns:r="http://schemas.openxmlformats.org/officeDocument/2006/relationships" xmlns:mc="http://schemas.openxmlformats.org/markup-compatibility/2006" xmlns:mv="urn:schemas-microsoft-com:mac:vml" xmlns:p="http://schemas.openxmlformats.org/presentationml/2006/main" xmlns:c="http://schemas.openxmlformats.org/drawingml/2006/chart" xmlns:dgm="http://schemas.openxmlformats.org/drawingml/2006/diagram" xmlns:o="urn:schemas-microsoft-com:office:office" xmlns:v="urn:schemas-microsoft-com:vml" xmlns:pvml="urn:schemas-microsoft-com:office:powerpoint" xmlns:com="http://schemas.openxmlformats.org/drawingml/2006/compatibility" xmlns:p14="http://schemas.microsoft.com/office/powerpoint/2010/main" xmlns:p15="http://schemas.microsoft.com/office/powerpoint/2012/main" matchingName="Title only" type="titleOnly">
-  <p:cSld name="TITLE_ONLY">
     <p:spTree>
       <p:nvGrpSpPr>
         <p:cNvPr id="34" name="Shape 34"/>
@@ -4224,7 +3720,7 @@
       </p:grpSpPr>
       <p:sp>
         <p:nvSpPr>
-          <p:cNvPr id="35" name="Google Shape;35;p8"/>
+          <p:cNvPr id="35" name="Google Shape;35;p6"/>
           <p:cNvSpPr txBox="1"/>
           <p:nvPr>
             <p:ph type="title"/>
@@ -4347,7 +3843,157 @@
       </p:sp>
       <p:sp>
         <p:nvSpPr>
-          <p:cNvPr id="36" name="Google Shape;36;p8"/>
+          <p:cNvPr id="36" name="Google Shape;36;p6"/>
+          <p:cNvSpPr txBox="1"/>
+          <p:nvPr>
+            <p:ph idx="1" type="body"/>
+          </p:nvPr>
+        </p:nvSpPr>
+        <p:spPr>
+          <a:xfrm>
+            <a:off x="4832400" y="695275"/>
+            <a:ext cx="3999900" cy="4044000"/>
+          </a:xfrm>
+          <a:prstGeom prst="rect">
+            <a:avLst/>
+          </a:prstGeom>
+        </p:spPr>
+        <p:txBody>
+          <a:bodyPr anchorCtr="0" anchor="t" bIns="91425" lIns="91425" spcFirstLastPara="1" rIns="91425" wrap="square" tIns="91425"/>
+          <a:lstStyle>
+            <a:lvl1pPr indent="-317500" lvl="0" marL="457200" rtl="0">
+              <a:lnSpc>
+                <a:spcPct val="115000"/>
+              </a:lnSpc>
+              <a:spcBef>
+                <a:spcPts val="0"/>
+              </a:spcBef>
+              <a:spcAft>
+                <a:spcPts val="0"/>
+              </a:spcAft>
+              <a:buSzPts val="1400"/>
+              <a:buChar char="●"/>
+              <a:defRPr sz="1400"/>
+            </a:lvl1pPr>
+            <a:lvl2pPr indent="-304800" lvl="1" marL="914400" rtl="0">
+              <a:lnSpc>
+                <a:spcPct val="115000"/>
+              </a:lnSpc>
+              <a:spcBef>
+                <a:spcPts val="1200"/>
+              </a:spcBef>
+              <a:spcAft>
+                <a:spcPts val="0"/>
+              </a:spcAft>
+              <a:buSzPts val="1200"/>
+              <a:buChar char="○"/>
+              <a:defRPr sz="1200"/>
+            </a:lvl2pPr>
+            <a:lvl3pPr indent="-304800" lvl="2" marL="1371600" rtl="0">
+              <a:lnSpc>
+                <a:spcPct val="115000"/>
+              </a:lnSpc>
+              <a:spcBef>
+                <a:spcPts val="1200"/>
+              </a:spcBef>
+              <a:spcAft>
+                <a:spcPts val="0"/>
+              </a:spcAft>
+              <a:buSzPts val="1200"/>
+              <a:buChar char="■"/>
+              <a:defRPr sz="1200"/>
+            </a:lvl3pPr>
+            <a:lvl4pPr indent="-304800" lvl="3" marL="1828800" rtl="0">
+              <a:lnSpc>
+                <a:spcPct val="115000"/>
+              </a:lnSpc>
+              <a:spcBef>
+                <a:spcPts val="1200"/>
+              </a:spcBef>
+              <a:spcAft>
+                <a:spcPts val="0"/>
+              </a:spcAft>
+              <a:buSzPts val="1200"/>
+              <a:buChar char="●"/>
+              <a:defRPr sz="1200"/>
+            </a:lvl4pPr>
+            <a:lvl5pPr indent="-304800" lvl="4" marL="2286000" rtl="0">
+              <a:lnSpc>
+                <a:spcPct val="115000"/>
+              </a:lnSpc>
+              <a:spcBef>
+                <a:spcPts val="1200"/>
+              </a:spcBef>
+              <a:spcAft>
+                <a:spcPts val="0"/>
+              </a:spcAft>
+              <a:buSzPts val="1200"/>
+              <a:buChar char="○"/>
+              <a:defRPr sz="1200"/>
+            </a:lvl5pPr>
+            <a:lvl6pPr indent="-304800" lvl="5" marL="2743200" rtl="0">
+              <a:lnSpc>
+                <a:spcPct val="115000"/>
+              </a:lnSpc>
+              <a:spcBef>
+                <a:spcPts val="1200"/>
+              </a:spcBef>
+              <a:spcAft>
+                <a:spcPts val="0"/>
+              </a:spcAft>
+              <a:buSzPts val="1200"/>
+              <a:buChar char="■"/>
+              <a:defRPr sz="1200"/>
+            </a:lvl6pPr>
+            <a:lvl7pPr indent="-304800" lvl="6" marL="3200400" rtl="0">
+              <a:lnSpc>
+                <a:spcPct val="115000"/>
+              </a:lnSpc>
+              <a:spcBef>
+                <a:spcPts val="1200"/>
+              </a:spcBef>
+              <a:spcAft>
+                <a:spcPts val="0"/>
+              </a:spcAft>
+              <a:buSzPts val="1200"/>
+              <a:buChar char="●"/>
+              <a:defRPr sz="1200"/>
+            </a:lvl7pPr>
+            <a:lvl8pPr indent="-304800" lvl="7" marL="3657600" rtl="0">
+              <a:lnSpc>
+                <a:spcPct val="115000"/>
+              </a:lnSpc>
+              <a:spcBef>
+                <a:spcPts val="1200"/>
+              </a:spcBef>
+              <a:spcAft>
+                <a:spcPts val="0"/>
+              </a:spcAft>
+              <a:buSzPts val="1200"/>
+              <a:buChar char="○"/>
+              <a:defRPr sz="1200"/>
+            </a:lvl8pPr>
+            <a:lvl9pPr indent="-304800" lvl="8" marL="4114800" rtl="0">
+              <a:lnSpc>
+                <a:spcPct val="115000"/>
+              </a:lnSpc>
+              <a:spcBef>
+                <a:spcPts val="1200"/>
+              </a:spcBef>
+              <a:spcAft>
+                <a:spcPts val="1200"/>
+              </a:spcAft>
+              <a:buSzPts val="1200"/>
+              <a:buChar char="■"/>
+              <a:defRPr sz="1200"/>
+            </a:lvl9pPr>
+          </a:lstStyle>
+          <a:p/>
+        </p:txBody>
+      </p:sp>
+      <p:sp>
+        <p:nvSpPr>
+          <p:cNvPr id="37" name="Google Shape;37;p6"/>
           <p:cNvSpPr txBox="1"/>
           <p:nvPr>
             <p:ph idx="12" type="sldNum"/>
@@ -4355,7 +4001,7 @@
         </p:nvSpPr>
         <p:spPr>
           <a:xfrm>
-            <a:off x="8548658" y="4739417"/>
+            <a:off x="8548658" y="4796746"/>
             <a:ext cx="548700" cy="393600"/>
           </a:xfrm>
           <a:prstGeom prst="rect">
@@ -4422,6 +4068,996 @@
           </a:p>
         </p:txBody>
       </p:sp>
+      <p:sp>
+        <p:nvSpPr>
+          <p:cNvPr id="38" name="Google Shape;38;p6"/>
+          <p:cNvSpPr txBox="1"/>
+          <p:nvPr/>
+        </p:nvSpPr>
+        <p:spPr>
+          <a:xfrm>
+            <a:off x="3081450" y="4877896"/>
+            <a:ext cx="2981100" cy="231300"/>
+          </a:xfrm>
+          <a:prstGeom prst="rect">
+            <a:avLst/>
+          </a:prstGeom>
+          <a:noFill/>
+          <a:ln>
+            <a:noFill/>
+          </a:ln>
+        </p:spPr>
+        <p:txBody>
+          <a:bodyPr anchorCtr="0" anchor="ctr" bIns="91425" lIns="91425" spcFirstLastPara="1" rIns="91425" wrap="square" tIns="91425">
+            <a:noAutofit/>
+          </a:bodyPr>
+          <a:lstStyle/>
+          <a:p>
+            <a:pPr indent="0" lvl="0" marL="0" rtl="0" algn="ctr">
+              <a:spcBef>
+                <a:spcPts val="0"/>
+              </a:spcBef>
+              <a:spcAft>
+                <a:spcPts val="0"/>
+              </a:spcAft>
+              <a:buNone/>
+            </a:pPr>
+            <a:r>
+              <a:rPr lang="en" sz="1200">
+                <a:solidFill>
+                  <a:srgbClr val="FF8800"/>
+                </a:solidFill>
+              </a:rPr>
+              <a:t>BioHackathon Paris – 12/16 Nov 2018</a:t>
+            </a:r>
+            <a:endParaRPr sz="1200">
+              <a:solidFill>
+                <a:srgbClr val="FF8800"/>
+              </a:solidFill>
+            </a:endParaRPr>
+          </a:p>
+        </p:txBody>
+      </p:sp>
+      <p:pic>
+        <p:nvPicPr>
+          <p:cNvPr id="39" name="Google Shape;39;p6"/>
+          <p:cNvPicPr preferRelativeResize="0"/>
+          <p:nvPr/>
+        </p:nvPicPr>
+        <p:blipFill>
+          <a:blip r:embed="rId2">
+            <a:alphaModFix/>
+          </a:blip>
+          <a:stretch>
+            <a:fillRect/>
+          </a:stretch>
+        </p:blipFill>
+        <p:spPr>
+          <a:xfrm>
+            <a:off x="159575" y="4854058"/>
+            <a:ext cx="370725" cy="278975"/>
+          </a:xfrm>
+          <a:prstGeom prst="rect">
+            <a:avLst/>
+          </a:prstGeom>
+          <a:noFill/>
+          <a:ln>
+            <a:noFill/>
+          </a:ln>
+        </p:spPr>
+      </p:pic>
+      <p:cxnSp>
+        <p:nvCxnSpPr>
+          <p:cNvPr id="40" name="Google Shape;40;p6"/>
+          <p:cNvCxnSpPr/>
+          <p:nvPr/>
+        </p:nvCxnSpPr>
+        <p:spPr>
+          <a:xfrm>
+            <a:off x="7175" y="623450"/>
+            <a:ext cx="9144000" cy="0"/>
+          </a:xfrm>
+          <a:prstGeom prst="straightConnector1">
+            <a:avLst/>
+          </a:prstGeom>
+          <a:noFill/>
+          <a:ln cap="flat" cmpd="sng" w="9525">
+            <a:solidFill>
+              <a:srgbClr val="FF8800"/>
+            </a:solidFill>
+            <a:prstDash val="solid"/>
+            <a:round/>
+            <a:headEnd len="med" w="med" type="none"/>
+            <a:tailEnd len="med" w="med" type="none"/>
+          </a:ln>
+        </p:spPr>
+      </p:cxnSp>
+      <p:cxnSp>
+        <p:nvCxnSpPr>
+          <p:cNvPr id="41" name="Google Shape;41;p6"/>
+          <p:cNvCxnSpPr/>
+          <p:nvPr/>
+        </p:nvCxnSpPr>
+        <p:spPr>
+          <a:xfrm>
+            <a:off x="14250" y="4825450"/>
+            <a:ext cx="9144000" cy="0"/>
+          </a:xfrm>
+          <a:prstGeom prst="straightConnector1">
+            <a:avLst/>
+          </a:prstGeom>
+          <a:noFill/>
+          <a:ln cap="flat" cmpd="sng" w="9525">
+            <a:solidFill>
+              <a:srgbClr val="FF8800"/>
+            </a:solidFill>
+            <a:prstDash val="solid"/>
+            <a:round/>
+            <a:headEnd len="med" w="med" type="none"/>
+            <a:tailEnd len="med" w="med" type="none"/>
+          </a:ln>
+        </p:spPr>
+      </p:cxnSp>
+    </p:spTree>
+  </p:cSld>
+  <p:clrMapOvr>
+    <a:masterClrMapping/>
+  </p:clrMapOvr>
+</p:sldLayout>
+</file>
+
+<file path=ppt/slideLayouts/slideLayout6.xml><?xml version="1.0" encoding="utf-8"?>
+<p:sldLayout xmlns:a="http://schemas.openxmlformats.org/drawingml/2006/main" xmlns:r="http://schemas.openxmlformats.org/officeDocument/2006/relationships" xmlns:mc="http://schemas.openxmlformats.org/markup-compatibility/2006" xmlns:mv="urn:schemas-microsoft-com:mac:vml" xmlns:p="http://schemas.openxmlformats.org/presentationml/2006/main" xmlns:c="http://schemas.openxmlformats.org/drawingml/2006/chart" xmlns:dgm="http://schemas.openxmlformats.org/drawingml/2006/diagram" xmlns:o="urn:schemas-microsoft-com:office:office" xmlns:v="urn:schemas-microsoft-com:vml" xmlns:pvml="urn:schemas-microsoft-com:office:powerpoint" xmlns:com="http://schemas.openxmlformats.org/drawingml/2006/compatibility" xmlns:p14="http://schemas.microsoft.com/office/powerpoint/2010/main" xmlns:p15="http://schemas.microsoft.com/office/powerpoint/2012/main" matchingName="Title and left column">
+  <p:cSld name="TITLE_AND_TWO_COLUMNS_1">
+    <p:spTree>
+      <p:nvGrpSpPr>
+        <p:cNvPr id="42" name="Shape 42"/>
+        <p:cNvGrpSpPr/>
+        <p:nvPr/>
+      </p:nvGrpSpPr>
+      <p:grpSpPr>
+        <a:xfrm>
+          <a:off x="0" y="0"/>
+          <a:ext cx="0" cy="0"/>
+          <a:chOff x="0" y="0"/>
+          <a:chExt cx="0" cy="0"/>
+        </a:xfrm>
+      </p:grpSpPr>
+      <p:sp>
+        <p:nvSpPr>
+          <p:cNvPr id="43" name="Google Shape;43;p7"/>
+          <p:cNvSpPr txBox="1"/>
+          <p:nvPr>
+            <p:ph type="title"/>
+          </p:nvPr>
+        </p:nvSpPr>
+        <p:spPr>
+          <a:xfrm>
+            <a:off x="311700" y="67550"/>
+            <a:ext cx="8520600" cy="572700"/>
+          </a:xfrm>
+          <a:prstGeom prst="rect">
+            <a:avLst/>
+          </a:prstGeom>
+        </p:spPr>
+        <p:txBody>
+          <a:bodyPr anchorCtr="0" anchor="t" bIns="91425" lIns="91425" spcFirstLastPara="1" rIns="91425" wrap="square" tIns="91425"/>
+          <a:lstStyle>
+            <a:lvl1pPr lvl="0" rtl="0">
+              <a:spcBef>
+                <a:spcPts val="0"/>
+              </a:spcBef>
+              <a:spcAft>
+                <a:spcPts val="0"/>
+              </a:spcAft>
+              <a:buSzPts val="2800"/>
+              <a:buNone/>
+              <a:defRPr/>
+            </a:lvl1pPr>
+            <a:lvl2pPr lvl="1" rtl="0">
+              <a:spcBef>
+                <a:spcPts val="0"/>
+              </a:spcBef>
+              <a:spcAft>
+                <a:spcPts val="0"/>
+              </a:spcAft>
+              <a:buSzPts val="2800"/>
+              <a:buNone/>
+              <a:defRPr/>
+            </a:lvl2pPr>
+            <a:lvl3pPr lvl="2" rtl="0">
+              <a:spcBef>
+                <a:spcPts val="0"/>
+              </a:spcBef>
+              <a:spcAft>
+                <a:spcPts val="0"/>
+              </a:spcAft>
+              <a:buSzPts val="2800"/>
+              <a:buNone/>
+              <a:defRPr/>
+            </a:lvl3pPr>
+            <a:lvl4pPr lvl="3" rtl="0">
+              <a:spcBef>
+                <a:spcPts val="0"/>
+              </a:spcBef>
+              <a:spcAft>
+                <a:spcPts val="0"/>
+              </a:spcAft>
+              <a:buSzPts val="2800"/>
+              <a:buNone/>
+              <a:defRPr/>
+            </a:lvl4pPr>
+            <a:lvl5pPr lvl="4" rtl="0">
+              <a:spcBef>
+                <a:spcPts val="0"/>
+              </a:spcBef>
+              <a:spcAft>
+                <a:spcPts val="0"/>
+              </a:spcAft>
+              <a:buSzPts val="2800"/>
+              <a:buNone/>
+              <a:defRPr/>
+            </a:lvl5pPr>
+            <a:lvl6pPr lvl="5" rtl="0">
+              <a:spcBef>
+                <a:spcPts val="0"/>
+              </a:spcBef>
+              <a:spcAft>
+                <a:spcPts val="0"/>
+              </a:spcAft>
+              <a:buSzPts val="2800"/>
+              <a:buNone/>
+              <a:defRPr/>
+            </a:lvl6pPr>
+            <a:lvl7pPr lvl="6" rtl="0">
+              <a:spcBef>
+                <a:spcPts val="0"/>
+              </a:spcBef>
+              <a:spcAft>
+                <a:spcPts val="0"/>
+              </a:spcAft>
+              <a:buSzPts val="2800"/>
+              <a:buNone/>
+              <a:defRPr/>
+            </a:lvl7pPr>
+            <a:lvl8pPr lvl="7" rtl="0">
+              <a:spcBef>
+                <a:spcPts val="0"/>
+              </a:spcBef>
+              <a:spcAft>
+                <a:spcPts val="0"/>
+              </a:spcAft>
+              <a:buSzPts val="2800"/>
+              <a:buNone/>
+              <a:defRPr/>
+            </a:lvl8pPr>
+            <a:lvl9pPr lvl="8" rtl="0">
+              <a:spcBef>
+                <a:spcPts val="0"/>
+              </a:spcBef>
+              <a:spcAft>
+                <a:spcPts val="0"/>
+              </a:spcAft>
+              <a:buSzPts val="2800"/>
+              <a:buNone/>
+              <a:defRPr/>
+            </a:lvl9pPr>
+          </a:lstStyle>
+          <a:p/>
+        </p:txBody>
+      </p:sp>
+      <p:sp>
+        <p:nvSpPr>
+          <p:cNvPr id="44" name="Google Shape;44;p7"/>
+          <p:cNvSpPr txBox="1"/>
+          <p:nvPr>
+            <p:ph idx="1" type="body"/>
+          </p:nvPr>
+        </p:nvSpPr>
+        <p:spPr>
+          <a:xfrm>
+            <a:off x="311700" y="695275"/>
+            <a:ext cx="3999900" cy="4044000"/>
+          </a:xfrm>
+          <a:prstGeom prst="rect">
+            <a:avLst/>
+          </a:prstGeom>
+        </p:spPr>
+        <p:txBody>
+          <a:bodyPr anchorCtr="0" anchor="t" bIns="91425" lIns="91425" spcFirstLastPara="1" rIns="91425" wrap="square" tIns="91425"/>
+          <a:lstStyle>
+            <a:lvl1pPr indent="-317500" lvl="0" marL="457200" rtl="0">
+              <a:lnSpc>
+                <a:spcPct val="115000"/>
+              </a:lnSpc>
+              <a:spcBef>
+                <a:spcPts val="0"/>
+              </a:spcBef>
+              <a:spcAft>
+                <a:spcPts val="0"/>
+              </a:spcAft>
+              <a:buSzPts val="1400"/>
+              <a:buChar char="●"/>
+              <a:defRPr sz="1400"/>
+            </a:lvl1pPr>
+            <a:lvl2pPr indent="-304800" lvl="1" marL="914400" rtl="0">
+              <a:lnSpc>
+                <a:spcPct val="115000"/>
+              </a:lnSpc>
+              <a:spcBef>
+                <a:spcPts val="1200"/>
+              </a:spcBef>
+              <a:spcAft>
+                <a:spcPts val="0"/>
+              </a:spcAft>
+              <a:buSzPts val="1200"/>
+              <a:buChar char="○"/>
+              <a:defRPr sz="1200"/>
+            </a:lvl2pPr>
+            <a:lvl3pPr indent="-304800" lvl="2" marL="1371600" rtl="0">
+              <a:lnSpc>
+                <a:spcPct val="115000"/>
+              </a:lnSpc>
+              <a:spcBef>
+                <a:spcPts val="1200"/>
+              </a:spcBef>
+              <a:spcAft>
+                <a:spcPts val="0"/>
+              </a:spcAft>
+              <a:buSzPts val="1200"/>
+              <a:buChar char="■"/>
+              <a:defRPr sz="1200"/>
+            </a:lvl3pPr>
+            <a:lvl4pPr indent="-304800" lvl="3" marL="1828800" rtl="0">
+              <a:lnSpc>
+                <a:spcPct val="115000"/>
+              </a:lnSpc>
+              <a:spcBef>
+                <a:spcPts val="1200"/>
+              </a:spcBef>
+              <a:spcAft>
+                <a:spcPts val="0"/>
+              </a:spcAft>
+              <a:buSzPts val="1200"/>
+              <a:buChar char="●"/>
+              <a:defRPr sz="1200"/>
+            </a:lvl4pPr>
+            <a:lvl5pPr indent="-304800" lvl="4" marL="2286000" rtl="0">
+              <a:lnSpc>
+                <a:spcPct val="115000"/>
+              </a:lnSpc>
+              <a:spcBef>
+                <a:spcPts val="1200"/>
+              </a:spcBef>
+              <a:spcAft>
+                <a:spcPts val="0"/>
+              </a:spcAft>
+              <a:buSzPts val="1200"/>
+              <a:buChar char="○"/>
+              <a:defRPr sz="1200"/>
+            </a:lvl5pPr>
+            <a:lvl6pPr indent="-304800" lvl="5" marL="2743200" rtl="0">
+              <a:lnSpc>
+                <a:spcPct val="115000"/>
+              </a:lnSpc>
+              <a:spcBef>
+                <a:spcPts val="1200"/>
+              </a:spcBef>
+              <a:spcAft>
+                <a:spcPts val="0"/>
+              </a:spcAft>
+              <a:buSzPts val="1200"/>
+              <a:buChar char="■"/>
+              <a:defRPr sz="1200"/>
+            </a:lvl6pPr>
+            <a:lvl7pPr indent="-304800" lvl="6" marL="3200400" rtl="0">
+              <a:lnSpc>
+                <a:spcPct val="115000"/>
+              </a:lnSpc>
+              <a:spcBef>
+                <a:spcPts val="1200"/>
+              </a:spcBef>
+              <a:spcAft>
+                <a:spcPts val="0"/>
+              </a:spcAft>
+              <a:buSzPts val="1200"/>
+              <a:buChar char="●"/>
+              <a:defRPr sz="1200"/>
+            </a:lvl7pPr>
+            <a:lvl8pPr indent="-304800" lvl="7" marL="3657600" rtl="0">
+              <a:lnSpc>
+                <a:spcPct val="115000"/>
+              </a:lnSpc>
+              <a:spcBef>
+                <a:spcPts val="1200"/>
+              </a:spcBef>
+              <a:spcAft>
+                <a:spcPts val="0"/>
+              </a:spcAft>
+              <a:buSzPts val="1200"/>
+              <a:buChar char="○"/>
+              <a:defRPr sz="1200"/>
+            </a:lvl8pPr>
+            <a:lvl9pPr indent="-304800" lvl="8" marL="4114800" rtl="0">
+              <a:lnSpc>
+                <a:spcPct val="115000"/>
+              </a:lnSpc>
+              <a:spcBef>
+                <a:spcPts val="1200"/>
+              </a:spcBef>
+              <a:spcAft>
+                <a:spcPts val="1200"/>
+              </a:spcAft>
+              <a:buSzPts val="1200"/>
+              <a:buChar char="■"/>
+              <a:defRPr sz="1200"/>
+            </a:lvl9pPr>
+          </a:lstStyle>
+          <a:p/>
+        </p:txBody>
+      </p:sp>
+      <p:sp>
+        <p:nvSpPr>
+          <p:cNvPr id="45" name="Google Shape;45;p7"/>
+          <p:cNvSpPr txBox="1"/>
+          <p:nvPr>
+            <p:ph idx="12" type="sldNum"/>
+          </p:nvPr>
+        </p:nvSpPr>
+        <p:spPr>
+          <a:xfrm>
+            <a:off x="8548658" y="4796746"/>
+            <a:ext cx="548700" cy="393600"/>
+          </a:xfrm>
+          <a:prstGeom prst="rect">
+            <a:avLst/>
+          </a:prstGeom>
+        </p:spPr>
+        <p:txBody>
+          <a:bodyPr anchorCtr="0" anchor="b" bIns="91425" lIns="91425" spcFirstLastPara="1" rIns="91425" wrap="square" tIns="91425">
+            <a:noAutofit/>
+          </a:bodyPr>
+          <a:lstStyle>
+            <a:lvl1pPr lvl="0" rtl="0">
+              <a:buNone/>
+              <a:defRPr/>
+            </a:lvl1pPr>
+            <a:lvl2pPr lvl="1" rtl="0">
+              <a:buNone/>
+              <a:defRPr/>
+            </a:lvl2pPr>
+            <a:lvl3pPr lvl="2" rtl="0">
+              <a:buNone/>
+              <a:defRPr/>
+            </a:lvl3pPr>
+            <a:lvl4pPr lvl="3" rtl="0">
+              <a:buNone/>
+              <a:defRPr/>
+            </a:lvl4pPr>
+            <a:lvl5pPr lvl="4" rtl="0">
+              <a:buNone/>
+              <a:defRPr/>
+            </a:lvl5pPr>
+            <a:lvl6pPr lvl="5" rtl="0">
+              <a:buNone/>
+              <a:defRPr/>
+            </a:lvl6pPr>
+            <a:lvl7pPr lvl="6" rtl="0">
+              <a:buNone/>
+              <a:defRPr/>
+            </a:lvl7pPr>
+            <a:lvl8pPr lvl="7" rtl="0">
+              <a:buNone/>
+              <a:defRPr/>
+            </a:lvl8pPr>
+            <a:lvl9pPr lvl="8" rtl="0">
+              <a:buNone/>
+              <a:defRPr/>
+            </a:lvl9pPr>
+          </a:lstStyle>
+          <a:p>
+            <a:pPr indent="0" lvl="0" marL="0" rtl="0" algn="r">
+              <a:spcBef>
+                <a:spcPts val="0"/>
+              </a:spcBef>
+              <a:spcAft>
+                <a:spcPts val="0"/>
+              </a:spcAft>
+              <a:buNone/>
+            </a:pPr>
+            <a:fld id="{00000000-1234-1234-1234-123412341234}" type="slidenum">
+              <a:rPr lang="en"/>
+              <a:t>‹#›</a:t>
+            </a:fld>
+            <a:endParaRPr/>
+          </a:p>
+        </p:txBody>
+      </p:sp>
+      <p:sp>
+        <p:nvSpPr>
+          <p:cNvPr id="46" name="Google Shape;46;p7"/>
+          <p:cNvSpPr txBox="1"/>
+          <p:nvPr/>
+        </p:nvSpPr>
+        <p:spPr>
+          <a:xfrm>
+            <a:off x="3081450" y="4877896"/>
+            <a:ext cx="2981100" cy="231300"/>
+          </a:xfrm>
+          <a:prstGeom prst="rect">
+            <a:avLst/>
+          </a:prstGeom>
+          <a:noFill/>
+          <a:ln>
+            <a:noFill/>
+          </a:ln>
+        </p:spPr>
+        <p:txBody>
+          <a:bodyPr anchorCtr="0" anchor="ctr" bIns="91425" lIns="91425" spcFirstLastPara="1" rIns="91425" wrap="square" tIns="91425">
+            <a:noAutofit/>
+          </a:bodyPr>
+          <a:lstStyle/>
+          <a:p>
+            <a:pPr indent="0" lvl="0" marL="0" rtl="0" algn="ctr">
+              <a:spcBef>
+                <a:spcPts val="0"/>
+              </a:spcBef>
+              <a:spcAft>
+                <a:spcPts val="0"/>
+              </a:spcAft>
+              <a:buNone/>
+            </a:pPr>
+            <a:r>
+              <a:rPr lang="en" sz="1200">
+                <a:solidFill>
+                  <a:srgbClr val="FF8800"/>
+                </a:solidFill>
+              </a:rPr>
+              <a:t>BioHackathon Paris – 12/16 Nov 2018</a:t>
+            </a:r>
+            <a:endParaRPr sz="1200">
+              <a:solidFill>
+                <a:srgbClr val="FF8800"/>
+              </a:solidFill>
+            </a:endParaRPr>
+          </a:p>
+        </p:txBody>
+      </p:sp>
+      <p:pic>
+        <p:nvPicPr>
+          <p:cNvPr id="47" name="Google Shape;47;p7"/>
+          <p:cNvPicPr preferRelativeResize="0"/>
+          <p:nvPr/>
+        </p:nvPicPr>
+        <p:blipFill>
+          <a:blip r:embed="rId2">
+            <a:alphaModFix/>
+          </a:blip>
+          <a:stretch>
+            <a:fillRect/>
+          </a:stretch>
+        </p:blipFill>
+        <p:spPr>
+          <a:xfrm>
+            <a:off x="159575" y="4854058"/>
+            <a:ext cx="370725" cy="278975"/>
+          </a:xfrm>
+          <a:prstGeom prst="rect">
+            <a:avLst/>
+          </a:prstGeom>
+          <a:noFill/>
+          <a:ln>
+            <a:noFill/>
+          </a:ln>
+        </p:spPr>
+      </p:pic>
+      <p:cxnSp>
+        <p:nvCxnSpPr>
+          <p:cNvPr id="48" name="Google Shape;48;p7"/>
+          <p:cNvCxnSpPr/>
+          <p:nvPr/>
+        </p:nvCxnSpPr>
+        <p:spPr>
+          <a:xfrm>
+            <a:off x="7175" y="623450"/>
+            <a:ext cx="9144000" cy="0"/>
+          </a:xfrm>
+          <a:prstGeom prst="straightConnector1">
+            <a:avLst/>
+          </a:prstGeom>
+          <a:noFill/>
+          <a:ln cap="flat" cmpd="sng" w="9525">
+            <a:solidFill>
+              <a:srgbClr val="FF8800"/>
+            </a:solidFill>
+            <a:prstDash val="solid"/>
+            <a:round/>
+            <a:headEnd len="med" w="med" type="none"/>
+            <a:tailEnd len="med" w="med" type="none"/>
+          </a:ln>
+        </p:spPr>
+      </p:cxnSp>
+      <p:cxnSp>
+        <p:nvCxnSpPr>
+          <p:cNvPr id="49" name="Google Shape;49;p7"/>
+          <p:cNvCxnSpPr/>
+          <p:nvPr/>
+        </p:nvCxnSpPr>
+        <p:spPr>
+          <a:xfrm>
+            <a:off x="14250" y="4825450"/>
+            <a:ext cx="9144000" cy="0"/>
+          </a:xfrm>
+          <a:prstGeom prst="straightConnector1">
+            <a:avLst/>
+          </a:prstGeom>
+          <a:noFill/>
+          <a:ln cap="flat" cmpd="sng" w="9525">
+            <a:solidFill>
+              <a:srgbClr val="FF8800"/>
+            </a:solidFill>
+            <a:prstDash val="solid"/>
+            <a:round/>
+            <a:headEnd len="med" w="med" type="none"/>
+            <a:tailEnd len="med" w="med" type="none"/>
+          </a:ln>
+        </p:spPr>
+      </p:cxnSp>
+    </p:spTree>
+  </p:cSld>
+  <p:clrMapOvr>
+    <a:masterClrMapping/>
+  </p:clrMapOvr>
+</p:sldLayout>
+</file>
+
+<file path=ppt/slideLayouts/slideLayout7.xml><?xml version="1.0" encoding="utf-8"?>
+<p:sldLayout xmlns:a="http://schemas.openxmlformats.org/drawingml/2006/main" xmlns:r="http://schemas.openxmlformats.org/officeDocument/2006/relationships" xmlns:mc="http://schemas.openxmlformats.org/markup-compatibility/2006" xmlns:mv="urn:schemas-microsoft-com:mac:vml" xmlns:p="http://schemas.openxmlformats.org/presentationml/2006/main" xmlns:c="http://schemas.openxmlformats.org/drawingml/2006/chart" xmlns:dgm="http://schemas.openxmlformats.org/drawingml/2006/diagram" xmlns:o="urn:schemas-microsoft-com:office:office" xmlns:v="urn:schemas-microsoft-com:vml" xmlns:pvml="urn:schemas-microsoft-com:office:powerpoint" xmlns:com="http://schemas.openxmlformats.org/drawingml/2006/compatibility" xmlns:p14="http://schemas.microsoft.com/office/powerpoint/2010/main" xmlns:p15="http://schemas.microsoft.com/office/powerpoint/2012/main" matchingName="Title only" type="titleOnly">
+  <p:cSld name="TITLE_ONLY">
+    <p:spTree>
+      <p:nvGrpSpPr>
+        <p:cNvPr id="50" name="Shape 50"/>
+        <p:cNvGrpSpPr/>
+        <p:nvPr/>
+      </p:nvGrpSpPr>
+      <p:grpSpPr>
+        <a:xfrm>
+          <a:off x="0" y="0"/>
+          <a:ext cx="0" cy="0"/>
+          <a:chOff x="0" y="0"/>
+          <a:chExt cx="0" cy="0"/>
+        </a:xfrm>
+      </p:grpSpPr>
+      <p:sp>
+        <p:nvSpPr>
+          <p:cNvPr id="51" name="Google Shape;51;p8"/>
+          <p:cNvSpPr txBox="1"/>
+          <p:nvPr>
+            <p:ph type="title"/>
+          </p:nvPr>
+        </p:nvSpPr>
+        <p:spPr>
+          <a:xfrm>
+            <a:off x="311700" y="67550"/>
+            <a:ext cx="8520600" cy="572700"/>
+          </a:xfrm>
+          <a:prstGeom prst="rect">
+            <a:avLst/>
+          </a:prstGeom>
+        </p:spPr>
+        <p:txBody>
+          <a:bodyPr anchorCtr="0" anchor="t" bIns="91425" lIns="91425" spcFirstLastPara="1" rIns="91425" wrap="square" tIns="91425"/>
+          <a:lstStyle>
+            <a:lvl1pPr lvl="0" rtl="0">
+              <a:spcBef>
+                <a:spcPts val="0"/>
+              </a:spcBef>
+              <a:spcAft>
+                <a:spcPts val="0"/>
+              </a:spcAft>
+              <a:buSzPts val="2800"/>
+              <a:buNone/>
+              <a:defRPr/>
+            </a:lvl1pPr>
+            <a:lvl2pPr lvl="1" rtl="0">
+              <a:spcBef>
+                <a:spcPts val="0"/>
+              </a:spcBef>
+              <a:spcAft>
+                <a:spcPts val="0"/>
+              </a:spcAft>
+              <a:buSzPts val="2800"/>
+              <a:buNone/>
+              <a:defRPr/>
+            </a:lvl2pPr>
+            <a:lvl3pPr lvl="2" rtl="0">
+              <a:spcBef>
+                <a:spcPts val="0"/>
+              </a:spcBef>
+              <a:spcAft>
+                <a:spcPts val="0"/>
+              </a:spcAft>
+              <a:buSzPts val="2800"/>
+              <a:buNone/>
+              <a:defRPr/>
+            </a:lvl3pPr>
+            <a:lvl4pPr lvl="3" rtl="0">
+              <a:spcBef>
+                <a:spcPts val="0"/>
+              </a:spcBef>
+              <a:spcAft>
+                <a:spcPts val="0"/>
+              </a:spcAft>
+              <a:buSzPts val="2800"/>
+              <a:buNone/>
+              <a:defRPr/>
+            </a:lvl4pPr>
+            <a:lvl5pPr lvl="4" rtl="0">
+              <a:spcBef>
+                <a:spcPts val="0"/>
+              </a:spcBef>
+              <a:spcAft>
+                <a:spcPts val="0"/>
+              </a:spcAft>
+              <a:buSzPts val="2800"/>
+              <a:buNone/>
+              <a:defRPr/>
+            </a:lvl5pPr>
+            <a:lvl6pPr lvl="5" rtl="0">
+              <a:spcBef>
+                <a:spcPts val="0"/>
+              </a:spcBef>
+              <a:spcAft>
+                <a:spcPts val="0"/>
+              </a:spcAft>
+              <a:buSzPts val="2800"/>
+              <a:buNone/>
+              <a:defRPr/>
+            </a:lvl6pPr>
+            <a:lvl7pPr lvl="6" rtl="0">
+              <a:spcBef>
+                <a:spcPts val="0"/>
+              </a:spcBef>
+              <a:spcAft>
+                <a:spcPts val="0"/>
+              </a:spcAft>
+              <a:buSzPts val="2800"/>
+              <a:buNone/>
+              <a:defRPr/>
+            </a:lvl7pPr>
+            <a:lvl8pPr lvl="7" rtl="0">
+              <a:spcBef>
+                <a:spcPts val="0"/>
+              </a:spcBef>
+              <a:spcAft>
+                <a:spcPts val="0"/>
+              </a:spcAft>
+              <a:buSzPts val="2800"/>
+              <a:buNone/>
+              <a:defRPr/>
+            </a:lvl8pPr>
+            <a:lvl9pPr lvl="8" rtl="0">
+              <a:spcBef>
+                <a:spcPts val="0"/>
+              </a:spcBef>
+              <a:spcAft>
+                <a:spcPts val="0"/>
+              </a:spcAft>
+              <a:buSzPts val="2800"/>
+              <a:buNone/>
+              <a:defRPr/>
+            </a:lvl9pPr>
+          </a:lstStyle>
+          <a:p/>
+        </p:txBody>
+      </p:sp>
+      <p:sp>
+        <p:nvSpPr>
+          <p:cNvPr id="52" name="Google Shape;52;p8"/>
+          <p:cNvSpPr txBox="1"/>
+          <p:nvPr>
+            <p:ph idx="12" type="sldNum"/>
+          </p:nvPr>
+        </p:nvSpPr>
+        <p:spPr>
+          <a:xfrm>
+            <a:off x="8548658" y="4796746"/>
+            <a:ext cx="548700" cy="393600"/>
+          </a:xfrm>
+          <a:prstGeom prst="rect">
+            <a:avLst/>
+          </a:prstGeom>
+        </p:spPr>
+        <p:txBody>
+          <a:bodyPr anchorCtr="0" anchor="b" bIns="91425" lIns="91425" spcFirstLastPara="1" rIns="91425" wrap="square" tIns="91425">
+            <a:noAutofit/>
+          </a:bodyPr>
+          <a:lstStyle>
+            <a:lvl1pPr lvl="0" rtl="0">
+              <a:buNone/>
+              <a:defRPr/>
+            </a:lvl1pPr>
+            <a:lvl2pPr lvl="1" rtl="0">
+              <a:buNone/>
+              <a:defRPr/>
+            </a:lvl2pPr>
+            <a:lvl3pPr lvl="2" rtl="0">
+              <a:buNone/>
+              <a:defRPr/>
+            </a:lvl3pPr>
+            <a:lvl4pPr lvl="3" rtl="0">
+              <a:buNone/>
+              <a:defRPr/>
+            </a:lvl4pPr>
+            <a:lvl5pPr lvl="4" rtl="0">
+              <a:buNone/>
+              <a:defRPr/>
+            </a:lvl5pPr>
+            <a:lvl6pPr lvl="5" rtl="0">
+              <a:buNone/>
+              <a:defRPr/>
+            </a:lvl6pPr>
+            <a:lvl7pPr lvl="6" rtl="0">
+              <a:buNone/>
+              <a:defRPr/>
+            </a:lvl7pPr>
+            <a:lvl8pPr lvl="7" rtl="0">
+              <a:buNone/>
+              <a:defRPr/>
+            </a:lvl8pPr>
+            <a:lvl9pPr lvl="8" rtl="0">
+              <a:buNone/>
+              <a:defRPr/>
+            </a:lvl9pPr>
+          </a:lstStyle>
+          <a:p>
+            <a:pPr indent="0" lvl="0" marL="0" rtl="0" algn="r">
+              <a:spcBef>
+                <a:spcPts val="0"/>
+              </a:spcBef>
+              <a:spcAft>
+                <a:spcPts val="0"/>
+              </a:spcAft>
+              <a:buNone/>
+            </a:pPr>
+            <a:fld id="{00000000-1234-1234-1234-123412341234}" type="slidenum">
+              <a:rPr lang="en"/>
+              <a:t>‹#›</a:t>
+            </a:fld>
+            <a:endParaRPr/>
+          </a:p>
+        </p:txBody>
+      </p:sp>
+      <p:sp>
+        <p:nvSpPr>
+          <p:cNvPr id="53" name="Google Shape;53;p8"/>
+          <p:cNvSpPr txBox="1"/>
+          <p:nvPr/>
+        </p:nvSpPr>
+        <p:spPr>
+          <a:xfrm>
+            <a:off x="3081450" y="4877896"/>
+            <a:ext cx="2981100" cy="231300"/>
+          </a:xfrm>
+          <a:prstGeom prst="rect">
+            <a:avLst/>
+          </a:prstGeom>
+          <a:noFill/>
+          <a:ln>
+            <a:noFill/>
+          </a:ln>
+        </p:spPr>
+        <p:txBody>
+          <a:bodyPr anchorCtr="0" anchor="ctr" bIns="91425" lIns="91425" spcFirstLastPara="1" rIns="91425" wrap="square" tIns="91425">
+            <a:noAutofit/>
+          </a:bodyPr>
+          <a:lstStyle/>
+          <a:p>
+            <a:pPr indent="0" lvl="0" marL="0" rtl="0" algn="ctr">
+              <a:spcBef>
+                <a:spcPts val="0"/>
+              </a:spcBef>
+              <a:spcAft>
+                <a:spcPts val="0"/>
+              </a:spcAft>
+              <a:buNone/>
+            </a:pPr>
+            <a:r>
+              <a:rPr lang="en" sz="1200">
+                <a:solidFill>
+                  <a:srgbClr val="FF8800"/>
+                </a:solidFill>
+              </a:rPr>
+              <a:t>BioHackathon Paris – 12/16 Nov 2018</a:t>
+            </a:r>
+            <a:endParaRPr sz="1200">
+              <a:solidFill>
+                <a:srgbClr val="FF8800"/>
+              </a:solidFill>
+            </a:endParaRPr>
+          </a:p>
+        </p:txBody>
+      </p:sp>
+      <p:pic>
+        <p:nvPicPr>
+          <p:cNvPr id="54" name="Google Shape;54;p8"/>
+          <p:cNvPicPr preferRelativeResize="0"/>
+          <p:nvPr/>
+        </p:nvPicPr>
+        <p:blipFill>
+          <a:blip r:embed="rId2">
+            <a:alphaModFix/>
+          </a:blip>
+          <a:stretch>
+            <a:fillRect/>
+          </a:stretch>
+        </p:blipFill>
+        <p:spPr>
+          <a:xfrm>
+            <a:off x="159575" y="4854058"/>
+            <a:ext cx="370725" cy="278975"/>
+          </a:xfrm>
+          <a:prstGeom prst="rect">
+            <a:avLst/>
+          </a:prstGeom>
+          <a:noFill/>
+          <a:ln>
+            <a:noFill/>
+          </a:ln>
+        </p:spPr>
+      </p:pic>
+      <p:cxnSp>
+        <p:nvCxnSpPr>
+          <p:cNvPr id="55" name="Google Shape;55;p8"/>
+          <p:cNvCxnSpPr/>
+          <p:nvPr/>
+        </p:nvCxnSpPr>
+        <p:spPr>
+          <a:xfrm>
+            <a:off x="7175" y="623450"/>
+            <a:ext cx="9144000" cy="0"/>
+          </a:xfrm>
+          <a:prstGeom prst="straightConnector1">
+            <a:avLst/>
+          </a:prstGeom>
+          <a:noFill/>
+          <a:ln cap="flat" cmpd="sng" w="9525">
+            <a:solidFill>
+              <a:srgbClr val="FF8800"/>
+            </a:solidFill>
+            <a:prstDash val="solid"/>
+            <a:round/>
+            <a:headEnd len="med" w="med" type="none"/>
+            <a:tailEnd len="med" w="med" type="none"/>
+          </a:ln>
+        </p:spPr>
+      </p:cxnSp>
+      <p:cxnSp>
+        <p:nvCxnSpPr>
+          <p:cNvPr id="56" name="Google Shape;56;p8"/>
+          <p:cNvCxnSpPr/>
+          <p:nvPr/>
+        </p:nvCxnSpPr>
+        <p:spPr>
+          <a:xfrm>
+            <a:off x="14250" y="4825450"/>
+            <a:ext cx="9144000" cy="0"/>
+          </a:xfrm>
+          <a:prstGeom prst="straightConnector1">
+            <a:avLst/>
+          </a:prstGeom>
+          <a:noFill/>
+          <a:ln cap="flat" cmpd="sng" w="9525">
+            <a:solidFill>
+              <a:srgbClr val="FF8800"/>
+            </a:solidFill>
+            <a:prstDash val="solid"/>
+            <a:round/>
+            <a:headEnd len="med" w="med" type="none"/>
+            <a:tailEnd len="med" w="med" type="none"/>
+          </a:ln>
+        </p:spPr>
+      </p:cxnSp>
     </p:spTree>
   </p:cSld>
   <p:clrMapOvr>
@@ -4435,7 +5071,7 @@
   <p:cSld name="CAPTION_ONLY">
     <p:spTree>
       <p:nvGrpSpPr>
-        <p:cNvPr id="37" name="Shape 37"/>
+        <p:cNvPr id="57" name="Shape 57"/>
         <p:cNvGrpSpPr/>
         <p:nvPr/>
       </p:nvGrpSpPr>
@@ -4449,7 +5085,7 @@
       </p:grpSpPr>
       <p:sp>
         <p:nvSpPr>
-          <p:cNvPr id="38" name="Google Shape;38;p9"/>
+          <p:cNvPr id="58" name="Google Shape;58;p9"/>
           <p:cNvSpPr txBox="1"/>
           <p:nvPr>
             <p:ph idx="1" type="body"/>
@@ -4487,7 +5123,7 @@
       </p:sp>
       <p:sp>
         <p:nvSpPr>
-          <p:cNvPr id="39" name="Google Shape;39;p9"/>
+          <p:cNvPr id="59" name="Google Shape;59;p9"/>
           <p:cNvSpPr txBox="1"/>
           <p:nvPr>
             <p:ph idx="12" type="sldNum"/>
@@ -4495,7 +5131,7 @@
         </p:nvSpPr>
         <p:spPr>
           <a:xfrm>
-            <a:off x="8548658" y="4739417"/>
+            <a:off x="8548658" y="4796746"/>
             <a:ext cx="548700" cy="393600"/>
           </a:xfrm>
           <a:prstGeom prst="rect">
@@ -4575,7 +5211,7 @@
   <p:cSld name="BLANK">
     <p:spTree>
       <p:nvGrpSpPr>
-        <p:cNvPr id="40" name="Shape 40"/>
+        <p:cNvPr id="60" name="Shape 60"/>
         <p:cNvGrpSpPr/>
         <p:nvPr/>
       </p:nvGrpSpPr>
@@ -4589,7 +5225,7 @@
       </p:grpSpPr>
       <p:sp>
         <p:nvSpPr>
-          <p:cNvPr id="41" name="Google Shape;41;p10"/>
+          <p:cNvPr id="61" name="Google Shape;61;p10"/>
           <p:cNvSpPr txBox="1"/>
           <p:nvPr>
             <p:ph idx="12" type="sldNum"/>
@@ -4597,7 +5233,7 @@
         </p:nvSpPr>
         <p:spPr>
           <a:xfrm>
-            <a:off x="8548658" y="4739417"/>
+            <a:off x="8548658" y="4796746"/>
             <a:ext cx="548700" cy="393600"/>
           </a:xfrm>
           <a:prstGeom prst="rect">
@@ -4728,13 +5364,13 @@
                 <a:spcPts val="0"/>
               </a:spcAft>
               <a:buClr>
-                <a:srgbClr val="F6B26B"/>
+                <a:srgbClr val="FF8800"/>
               </a:buClr>
               <a:buSzPts val="2800"/>
               <a:buNone/>
               <a:defRPr sz="2800">
                 <a:solidFill>
-                  <a:srgbClr val="F6B26B"/>
+                  <a:srgbClr val="FF8800"/>
                 </a:solidFill>
               </a:defRPr>
             </a:lvl1pPr>
@@ -4746,13 +5382,13 @@
                 <a:spcPts val="0"/>
               </a:spcAft>
               <a:buClr>
-                <a:srgbClr val="F6B26B"/>
+                <a:srgbClr val="FF8800"/>
               </a:buClr>
               <a:buSzPts val="2800"/>
               <a:buNone/>
               <a:defRPr sz="2800">
                 <a:solidFill>
-                  <a:srgbClr val="F6B26B"/>
+                  <a:srgbClr val="FF8800"/>
                 </a:solidFill>
               </a:defRPr>
             </a:lvl2pPr>
@@ -4764,13 +5400,13 @@
                 <a:spcPts val="0"/>
               </a:spcAft>
               <a:buClr>
-                <a:srgbClr val="F6B26B"/>
+                <a:srgbClr val="FF8800"/>
               </a:buClr>
               <a:buSzPts val="2800"/>
               <a:buNone/>
               <a:defRPr sz="2800">
                 <a:solidFill>
-                  <a:srgbClr val="F6B26B"/>
+                  <a:srgbClr val="FF8800"/>
                 </a:solidFill>
               </a:defRPr>
             </a:lvl3pPr>
@@ -4782,13 +5418,13 @@
                 <a:spcPts val="0"/>
               </a:spcAft>
               <a:buClr>
-                <a:srgbClr val="F6B26B"/>
+                <a:srgbClr val="FF8800"/>
               </a:buClr>
               <a:buSzPts val="2800"/>
               <a:buNone/>
               <a:defRPr sz="2800">
                 <a:solidFill>
-                  <a:srgbClr val="F6B26B"/>
+                  <a:srgbClr val="FF8800"/>
                 </a:solidFill>
               </a:defRPr>
             </a:lvl4pPr>
@@ -4800,13 +5436,13 @@
                 <a:spcPts val="0"/>
               </a:spcAft>
               <a:buClr>
-                <a:srgbClr val="F6B26B"/>
+                <a:srgbClr val="FF8800"/>
               </a:buClr>
               <a:buSzPts val="2800"/>
               <a:buNone/>
               <a:defRPr sz="2800">
                 <a:solidFill>
-                  <a:srgbClr val="F6B26B"/>
+                  <a:srgbClr val="FF8800"/>
                 </a:solidFill>
               </a:defRPr>
             </a:lvl5pPr>
@@ -4818,13 +5454,13 @@
                 <a:spcPts val="0"/>
               </a:spcAft>
               <a:buClr>
-                <a:srgbClr val="F6B26B"/>
+                <a:srgbClr val="FF8800"/>
               </a:buClr>
               <a:buSzPts val="2800"/>
               <a:buNone/>
               <a:defRPr sz="2800">
                 <a:solidFill>
-                  <a:srgbClr val="F6B26B"/>
+                  <a:srgbClr val="FF8800"/>
                 </a:solidFill>
               </a:defRPr>
             </a:lvl6pPr>
@@ -4836,13 +5472,13 @@
                 <a:spcPts val="0"/>
               </a:spcAft>
               <a:buClr>
-                <a:srgbClr val="F6B26B"/>
+                <a:srgbClr val="FF8800"/>
               </a:buClr>
               <a:buSzPts val="2800"/>
               <a:buNone/>
               <a:defRPr sz="2800">
                 <a:solidFill>
-                  <a:srgbClr val="F6B26B"/>
+                  <a:srgbClr val="FF8800"/>
                 </a:solidFill>
               </a:defRPr>
             </a:lvl7pPr>
@@ -4854,13 +5490,13 @@
                 <a:spcPts val="0"/>
               </a:spcAft>
               <a:buClr>
-                <a:srgbClr val="F6B26B"/>
+                <a:srgbClr val="FF8800"/>
               </a:buClr>
               <a:buSzPts val="2800"/>
               <a:buNone/>
               <a:defRPr sz="2800">
                 <a:solidFill>
-                  <a:srgbClr val="F6B26B"/>
+                  <a:srgbClr val="FF8800"/>
                 </a:solidFill>
               </a:defRPr>
             </a:lvl8pPr>
@@ -4872,13 +5508,13 @@
                 <a:spcPts val="0"/>
               </a:spcAft>
               <a:buClr>
-                <a:srgbClr val="F6B26B"/>
+                <a:srgbClr val="FF8800"/>
               </a:buClr>
               <a:buSzPts val="2800"/>
               <a:buNone/>
               <a:defRPr sz="2800">
                 <a:solidFill>
-                  <a:srgbClr val="F6B26B"/>
+                  <a:srgbClr val="FF8800"/>
                 </a:solidFill>
               </a:defRPr>
             </a:lvl9pPr>
@@ -5113,7 +5749,7 @@
         </p:nvSpPr>
         <p:spPr>
           <a:xfrm>
-            <a:off x="8548658" y="4739417"/>
+            <a:off x="8548658" y="4796746"/>
             <a:ext cx="548700" cy="393600"/>
           </a:xfrm>
           <a:prstGeom prst="rect">
@@ -5932,7 +6568,7 @@
   <p:cSld>
     <p:spTree>
       <p:nvGrpSpPr>
-        <p:cNvPr id="45" name="Shape 45"/>
+        <p:cNvPr id="65" name="Shape 65"/>
         <p:cNvGrpSpPr/>
         <p:nvPr/>
       </p:nvGrpSpPr>
@@ -5946,7 +6582,7 @@
       </p:grpSpPr>
       <p:sp>
         <p:nvSpPr>
-          <p:cNvPr id="46" name="Google Shape;46;p11"/>
+          <p:cNvPr id="66" name="Google Shape;66;p11"/>
           <p:cNvSpPr txBox="1"/>
           <p:nvPr>
             <p:ph type="ctrTitle"/>
@@ -5986,7 +6622,7 @@
       </p:sp>
       <p:sp>
         <p:nvSpPr>
-          <p:cNvPr id="47" name="Google Shape;47;p11"/>
+          <p:cNvPr id="67" name="Google Shape;67;p11"/>
           <p:cNvSpPr txBox="1"/>
           <p:nvPr>
             <p:ph idx="1" type="subTitle"/>
@@ -6151,7 +6787,7 @@
       </p:sp>
       <p:sp>
         <p:nvSpPr>
-          <p:cNvPr id="48" name="Google Shape;48;p11"/>
+          <p:cNvPr id="68" name="Google Shape;68;p11"/>
           <p:cNvSpPr txBox="1"/>
           <p:nvPr>
             <p:ph idx="2" type="subTitle"/>
@@ -6240,7 +6876,7 @@
   <p:cSld>
     <p:spTree>
       <p:nvGrpSpPr>
-        <p:cNvPr id="101" name="Shape 101"/>
+        <p:cNvPr id="121" name="Shape 121"/>
         <p:cNvGrpSpPr/>
         <p:nvPr/>
       </p:nvGrpSpPr>
@@ -6254,7 +6890,7 @@
       </p:grpSpPr>
       <p:sp>
         <p:nvSpPr>
-          <p:cNvPr id="102" name="Google Shape;102;p20"/>
+          <p:cNvPr id="122" name="Google Shape;122;p20"/>
           <p:cNvSpPr txBox="1"/>
           <p:nvPr>
             <p:ph type="title"/>
@@ -6294,7 +6930,7 @@
       </p:sp>
       <p:sp>
         <p:nvSpPr>
-          <p:cNvPr id="103" name="Google Shape;103;p20"/>
+          <p:cNvPr id="123" name="Google Shape;123;p20"/>
           <p:cNvSpPr txBox="1"/>
           <p:nvPr>
             <p:ph idx="1" type="body"/>
@@ -6401,7 +7037,7 @@
       </p:sp>
       <p:sp>
         <p:nvSpPr>
-          <p:cNvPr id="104" name="Google Shape;104;p20"/>
+          <p:cNvPr id="124" name="Google Shape;124;p20"/>
           <p:cNvSpPr txBox="1"/>
           <p:nvPr>
             <p:ph idx="12" type="sldNum"/>
@@ -6409,7 +7045,7 @@
         </p:nvSpPr>
         <p:spPr>
           <a:xfrm>
-            <a:off x="8548658" y="4739417"/>
+            <a:off x="8548658" y="4796746"/>
             <a:ext cx="548700" cy="393600"/>
           </a:xfrm>
           <a:prstGeom prst="rect">
@@ -6452,7 +7088,7 @@
   <p:cSld>
     <p:spTree>
       <p:nvGrpSpPr>
-        <p:cNvPr id="108" name="Shape 108"/>
+        <p:cNvPr id="128" name="Shape 128"/>
         <p:cNvGrpSpPr/>
         <p:nvPr/>
       </p:nvGrpSpPr>
@@ -6466,7 +7102,7 @@
       </p:grpSpPr>
       <p:sp>
         <p:nvSpPr>
-          <p:cNvPr id="109" name="Google Shape;109;p21"/>
+          <p:cNvPr id="129" name="Google Shape;129;p21"/>
           <p:cNvSpPr txBox="1"/>
           <p:nvPr>
             <p:ph type="title"/>
@@ -6506,7 +7142,7 @@
       </p:sp>
       <p:sp>
         <p:nvSpPr>
-          <p:cNvPr id="110" name="Google Shape;110;p21"/>
+          <p:cNvPr id="130" name="Google Shape;130;p21"/>
           <p:cNvSpPr txBox="1"/>
           <p:nvPr>
             <p:ph idx="1" type="body"/>
@@ -6655,7 +7291,7 @@
       </p:sp>
       <p:sp>
         <p:nvSpPr>
-          <p:cNvPr id="111" name="Google Shape;111;p21"/>
+          <p:cNvPr id="131" name="Google Shape;131;p21"/>
           <p:cNvSpPr txBox="1"/>
           <p:nvPr>
             <p:ph idx="12" type="sldNum"/>
@@ -6663,7 +7299,7 @@
         </p:nvSpPr>
         <p:spPr>
           <a:xfrm>
-            <a:off x="8548658" y="4739417"/>
+            <a:off x="8548658" y="4796746"/>
             <a:ext cx="548700" cy="393600"/>
           </a:xfrm>
           <a:prstGeom prst="rect">
@@ -6706,7 +7342,7 @@
   <p:cSld>
     <p:spTree>
       <p:nvGrpSpPr>
-        <p:cNvPr id="52" name="Shape 52"/>
+        <p:cNvPr id="72" name="Shape 72"/>
         <p:cNvGrpSpPr/>
         <p:nvPr/>
       </p:nvGrpSpPr>
@@ -6720,7 +7356,7 @@
       </p:grpSpPr>
       <p:sp>
         <p:nvSpPr>
-          <p:cNvPr id="53" name="Google Shape;53;p12"/>
+          <p:cNvPr id="73" name="Google Shape;73;p12"/>
           <p:cNvSpPr txBox="1"/>
           <p:nvPr>
             <p:ph type="title"/>
@@ -6771,7 +7407,7 @@
   <p:cSld>
     <p:spTree>
       <p:nvGrpSpPr>
-        <p:cNvPr id="57" name="Shape 57"/>
+        <p:cNvPr id="77" name="Shape 77"/>
         <p:cNvGrpSpPr/>
         <p:nvPr/>
       </p:nvGrpSpPr>
@@ -6785,7 +7421,7 @@
       </p:grpSpPr>
       <p:sp>
         <p:nvSpPr>
-          <p:cNvPr id="58" name="Google Shape;58;p13"/>
+          <p:cNvPr id="78" name="Google Shape;78;p13"/>
           <p:cNvSpPr txBox="1"/>
           <p:nvPr>
             <p:ph type="title"/>
@@ -6825,7 +7461,7 @@
       </p:sp>
       <p:sp>
         <p:nvSpPr>
-          <p:cNvPr id="59" name="Google Shape;59;p13"/>
+          <p:cNvPr id="79" name="Google Shape;79;p13"/>
           <p:cNvSpPr txBox="1"/>
           <p:nvPr>
             <p:ph idx="1" type="body"/>
@@ -6873,7 +7509,7 @@
       </p:sp>
       <p:sp>
         <p:nvSpPr>
-          <p:cNvPr id="60" name="Google Shape;60;p13"/>
+          <p:cNvPr id="80" name="Google Shape;80;p13"/>
           <p:cNvSpPr txBox="1"/>
           <p:nvPr>
             <p:ph idx="12" type="sldNum"/>
@@ -6881,7 +7517,7 @@
         </p:nvSpPr>
         <p:spPr>
           <a:xfrm>
-            <a:off x="8548658" y="4739417"/>
+            <a:off x="8548658" y="4796746"/>
             <a:ext cx="548700" cy="393600"/>
           </a:xfrm>
           <a:prstGeom prst="rect">
@@ -6932,7 +7568,7 @@
   <p:cSld>
     <p:spTree>
       <p:nvGrpSpPr>
-        <p:cNvPr id="64" name="Shape 64"/>
+        <p:cNvPr id="84" name="Shape 84"/>
         <p:cNvGrpSpPr/>
         <p:nvPr/>
       </p:nvGrpSpPr>
@@ -6946,7 +7582,7 @@
       </p:grpSpPr>
       <p:sp>
         <p:nvSpPr>
-          <p:cNvPr id="65" name="Google Shape;65;p14"/>
+          <p:cNvPr id="85" name="Google Shape;85;p14"/>
           <p:cNvSpPr txBox="1"/>
           <p:nvPr>
             <p:ph type="title"/>
@@ -6986,7 +7622,7 @@
       </p:sp>
       <p:sp>
         <p:nvSpPr>
-          <p:cNvPr id="66" name="Google Shape;66;p14"/>
+          <p:cNvPr id="86" name="Google Shape;86;p14"/>
           <p:cNvSpPr txBox="1"/>
           <p:nvPr>
             <p:ph idx="1" type="body"/>
@@ -7052,7 +7688,7 @@
       </p:sp>
       <p:sp>
         <p:nvSpPr>
-          <p:cNvPr id="67" name="Google Shape;67;p14"/>
+          <p:cNvPr id="87" name="Google Shape;87;p14"/>
           <p:cNvSpPr txBox="1"/>
           <p:nvPr>
             <p:ph idx="12" type="sldNum"/>
@@ -7060,7 +7696,7 @@
         </p:nvSpPr>
         <p:spPr>
           <a:xfrm>
-            <a:off x="8548658" y="4739417"/>
+            <a:off x="8548658" y="4796746"/>
             <a:ext cx="548700" cy="393600"/>
           </a:xfrm>
           <a:prstGeom prst="rect">
@@ -7103,7 +7739,7 @@
   <p:cSld>
     <p:spTree>
       <p:nvGrpSpPr>
-        <p:cNvPr id="71" name="Shape 71"/>
+        <p:cNvPr id="91" name="Shape 91"/>
         <p:cNvGrpSpPr/>
         <p:nvPr/>
       </p:nvGrpSpPr>
@@ -7117,7 +7753,7 @@
       </p:grpSpPr>
       <p:sp>
         <p:nvSpPr>
-          <p:cNvPr id="72" name="Google Shape;72;p15"/>
+          <p:cNvPr id="92" name="Google Shape;92;p15"/>
           <p:cNvSpPr txBox="1"/>
           <p:nvPr>
             <p:ph type="title"/>
@@ -7172,7 +7808,7 @@
   <p:cSld>
     <p:spTree>
       <p:nvGrpSpPr>
-        <p:cNvPr id="76" name="Shape 76"/>
+        <p:cNvPr id="96" name="Shape 96"/>
         <p:cNvGrpSpPr/>
         <p:nvPr/>
       </p:nvGrpSpPr>
@@ -7186,7 +7822,7 @@
       </p:grpSpPr>
       <p:sp>
         <p:nvSpPr>
-          <p:cNvPr id="77" name="Google Shape;77;p16"/>
+          <p:cNvPr id="97" name="Google Shape;97;p16"/>
           <p:cNvSpPr txBox="1"/>
           <p:nvPr>
             <p:ph type="title"/>
@@ -7226,7 +7862,7 @@
       </p:sp>
       <p:sp>
         <p:nvSpPr>
-          <p:cNvPr id="78" name="Google Shape;78;p16"/>
+          <p:cNvPr id="98" name="Google Shape;98;p16"/>
           <p:cNvSpPr txBox="1"/>
           <p:nvPr>
             <p:ph idx="1" type="body"/>
@@ -7396,7 +8032,7 @@
   <p:cSld>
     <p:spTree>
       <p:nvGrpSpPr>
-        <p:cNvPr id="82" name="Shape 82"/>
+        <p:cNvPr id="102" name="Shape 102"/>
         <p:cNvGrpSpPr/>
         <p:nvPr/>
       </p:nvGrpSpPr>
@@ -7410,7 +8046,7 @@
       </p:grpSpPr>
       <p:sp>
         <p:nvSpPr>
-          <p:cNvPr id="83" name="Google Shape;83;p17"/>
+          <p:cNvPr id="103" name="Google Shape;103;p17"/>
           <p:cNvSpPr txBox="1"/>
           <p:nvPr>
             <p:ph type="title"/>
@@ -7450,7 +8086,7 @@
       </p:sp>
       <p:sp>
         <p:nvSpPr>
-          <p:cNvPr id="84" name="Google Shape;84;p17"/>
+          <p:cNvPr id="104" name="Google Shape;104;p17"/>
           <p:cNvSpPr txBox="1"/>
           <p:nvPr>
             <p:ph idx="1" type="body"/>
@@ -7542,7 +8178,7 @@
       </p:sp>
       <p:sp>
         <p:nvSpPr>
-          <p:cNvPr id="85" name="Google Shape;85;p17"/>
+          <p:cNvPr id="105" name="Google Shape;105;p17"/>
           <p:cNvSpPr txBox="1"/>
           <p:nvPr>
             <p:ph idx="12" type="sldNum"/>
@@ -7550,7 +8186,7 @@
         </p:nvSpPr>
         <p:spPr>
           <a:xfrm>
-            <a:off x="8548658" y="4739417"/>
+            <a:off x="8548658" y="4796746"/>
             <a:ext cx="548700" cy="393600"/>
           </a:xfrm>
           <a:prstGeom prst="rect">
@@ -7593,7 +8229,7 @@
   <p:cSld>
     <p:spTree>
       <p:nvGrpSpPr>
-        <p:cNvPr id="89" name="Shape 89"/>
+        <p:cNvPr id="109" name="Shape 109"/>
         <p:cNvGrpSpPr/>
         <p:nvPr/>
       </p:nvGrpSpPr>
@@ -7607,7 +8243,7 @@
       </p:grpSpPr>
       <p:sp>
         <p:nvSpPr>
-          <p:cNvPr id="90" name="Google Shape;90;p18"/>
+          <p:cNvPr id="110" name="Google Shape;110;p18"/>
           <p:cNvSpPr txBox="1"/>
           <p:nvPr>
             <p:ph type="title"/>
@@ -7658,7 +8294,7 @@
   <p:cSld>
     <p:spTree>
       <p:nvGrpSpPr>
-        <p:cNvPr id="94" name="Shape 94"/>
+        <p:cNvPr id="114" name="Shape 114"/>
         <p:cNvGrpSpPr/>
         <p:nvPr/>
       </p:nvGrpSpPr>
@@ -7672,7 +8308,7 @@
       </p:grpSpPr>
       <p:sp>
         <p:nvSpPr>
-          <p:cNvPr id="95" name="Google Shape;95;p19"/>
+          <p:cNvPr id="115" name="Google Shape;115;p19"/>
           <p:cNvSpPr txBox="1"/>
           <p:nvPr>
             <p:ph type="title"/>
@@ -7712,7 +8348,7 @@
       </p:sp>
       <p:sp>
         <p:nvSpPr>
-          <p:cNvPr id="96" name="Google Shape;96;p19"/>
+          <p:cNvPr id="116" name="Google Shape;116;p19"/>
           <p:cNvSpPr txBox="1"/>
           <p:nvPr>
             <p:ph idx="1" type="body"/>
@@ -7936,7 +8572,7 @@
       </p:sp>
       <p:sp>
         <p:nvSpPr>
-          <p:cNvPr id="97" name="Google Shape;97;p19"/>
+          <p:cNvPr id="117" name="Google Shape;117;p19"/>
           <p:cNvSpPr txBox="1"/>
           <p:nvPr>
             <p:ph idx="12" type="sldNum"/>
@@ -7944,7 +8580,7 @@
         </p:nvSpPr>
         <p:spPr>
           <a:xfrm>
-            <a:off x="8548658" y="4739417"/>
+            <a:off x="8548658" y="4796746"/>
             <a:ext cx="548700" cy="393600"/>
           </a:xfrm>
           <a:prstGeom prst="rect">
@@ -7983,6 +8619,285 @@
 </file>
 
 <file path=ppt/theme/theme1.xml><?xml version="1.0" encoding="utf-8"?>
+<a:theme xmlns:a="http://schemas.openxmlformats.org/drawingml/2006/main" xmlns:r="http://schemas.openxmlformats.org/officeDocument/2006/relationships" name="Simple Light">
+  <a:themeElements>
+    <a:clrScheme name="Simple Light">
+      <a:dk1>
+        <a:srgbClr val="000000"/>
+      </a:dk1>
+      <a:lt1>
+        <a:srgbClr val="FFFFFF"/>
+      </a:lt1>
+      <a:dk2>
+        <a:srgbClr val="595959"/>
+      </a:dk2>
+      <a:lt2>
+        <a:srgbClr val="EEEEEE"/>
+      </a:lt2>
+      <a:accent1>
+        <a:srgbClr val="FFAB40"/>
+      </a:accent1>
+      <a:accent2>
+        <a:srgbClr val="212121"/>
+      </a:accent2>
+      <a:accent3>
+        <a:srgbClr val="78909C"/>
+      </a:accent3>
+      <a:accent4>
+        <a:srgbClr val="FFAB40"/>
+      </a:accent4>
+      <a:accent5>
+        <a:srgbClr val="0097A7"/>
+      </a:accent5>
+      <a:accent6>
+        <a:srgbClr val="EEFF41"/>
+      </a:accent6>
+      <a:hlink>
+        <a:srgbClr val="0097A7"/>
+      </a:hlink>
+      <a:folHlink>
+        <a:srgbClr val="0097A7"/>
+      </a:folHlink>
+    </a:clrScheme>
+    <a:fontScheme name="Office">
+      <a:majorFont>
+        <a:latin typeface="Arial"/>
+        <a:ea typeface=""/>
+        <a:cs typeface=""/>
+        <a:font script="Jpan" typeface="ＭＳ Ｐゴシック"/>
+        <a:font script="Hang" typeface="맑은 고딕"/>
+        <a:font script="Hans" typeface="宋体"/>
+        <a:font script="Hant" typeface="新細明體"/>
+        <a:font script="Arab" typeface="Times New Roman"/>
+        <a:font script="Hebr" typeface="Times New Roman"/>
+        <a:font script="Thai" typeface="Angsana New"/>
+        <a:font script="Ethi" typeface="Nyala"/>
+        <a:font script="Beng" typeface="Vrinda"/>
+        <a:font script="Gujr" typeface="Shruti"/>
+        <a:font script="Khmr" typeface="MoolBoran"/>
+        <a:font script="Knda" typeface="Tunga"/>
+        <a:font script="Guru" typeface="Raavi"/>
+        <a:font script="Cans" typeface="Euphemia"/>
+        <a:font script="Cher" typeface="Plantagenet Cherokee"/>
+        <a:font script="Yiii" typeface="Microsoft Yi Baiti"/>
+        <a:font script="Tibt" typeface="Microsoft Himalaya"/>
+        <a:font script="Thaa" typeface="MV Boli"/>
+        <a:font script="Deva" typeface="Mangal"/>
+        <a:font script="Telu" typeface="Gautami"/>
+        <a:font script="Taml" typeface="Latha"/>
+        <a:font script="Syrc" typeface="Estrangelo Edessa"/>
+        <a:font script="Orya" typeface="Kalinga"/>
+        <a:font script="Mlym" typeface="Kartika"/>
+        <a:font script="Laoo" typeface="DokChampa"/>
+        <a:font script="Sinh" typeface="Iskoola Pota"/>
+        <a:font script="Mong" typeface="Mongolian Baiti"/>
+        <a:font script="Viet" typeface="Times New Roman"/>
+        <a:font script="Uigh" typeface="Microsoft Uighur"/>
+        <a:font script="Geor" typeface="Sylfaen"/>
+      </a:majorFont>
+      <a:minorFont>
+        <a:latin typeface="Arial"/>
+        <a:ea typeface=""/>
+        <a:cs typeface=""/>
+        <a:font script="Jpan" typeface="ＭＳ Ｐゴシック"/>
+        <a:font script="Hang" typeface="맑은 고딕"/>
+        <a:font script="Hans" typeface="宋体"/>
+        <a:font script="Hant" typeface="新細明體"/>
+        <a:font script="Arab" typeface="Arial"/>
+        <a:font script="Hebr" typeface="Arial"/>
+        <a:font script="Thai" typeface="Cordia New"/>
+        <a:font script="Ethi" typeface="Nyala"/>
+        <a:font script="Beng" typeface="Vrinda"/>
+        <a:font script="Gujr" typeface="Shruti"/>
+        <a:font script="Khmr" typeface="DaunPenh"/>
+        <a:font script="Knda" typeface="Tunga"/>
+        <a:font script="Guru" typeface="Raavi"/>
+        <a:font script="Cans" typeface="Euphemia"/>
+        <a:font script="Cher" typeface="Plantagenet Cherokee"/>
+        <a:font script="Yiii" typeface="Microsoft Yi Baiti"/>
+        <a:font script="Tibt" typeface="Microsoft Himalaya"/>
+        <a:font script="Thaa" typeface="MV Boli"/>
+        <a:font script="Deva" typeface="Mangal"/>
+        <a:font script="Telu" typeface="Gautami"/>
+        <a:font script="Taml" typeface="Latha"/>
+        <a:font script="Syrc" typeface="Estrangelo Edessa"/>
+        <a:font script="Orya" typeface="Kalinga"/>
+        <a:font script="Mlym" typeface="Kartika"/>
+        <a:font script="Laoo" typeface="DokChampa"/>
+        <a:font script="Sinh" typeface="Iskoola Pota"/>
+        <a:font script="Mong" typeface="Mongolian Baiti"/>
+        <a:font script="Viet" typeface="Arial"/>
+        <a:font script="Uigh" typeface="Microsoft Uighur"/>
+        <a:font script="Geor" typeface="Sylfaen"/>
+      </a:minorFont>
+    </a:fontScheme>
+    <a:fmtScheme name="Office">
+      <a:fillStyleLst>
+        <a:solidFill>
+          <a:schemeClr val="phClr"/>
+        </a:solidFill>
+        <a:gradFill rotWithShape="1">
+          <a:gsLst>
+            <a:gs pos="0">
+              <a:schemeClr val="phClr">
+                <a:tint val="50000"/>
+                <a:satMod val="300000"/>
+              </a:schemeClr>
+            </a:gs>
+            <a:gs pos="35000">
+              <a:schemeClr val="phClr">
+                <a:tint val="37000"/>
+                <a:satMod val="300000"/>
+              </a:schemeClr>
+            </a:gs>
+            <a:gs pos="100000">
+              <a:schemeClr val="phClr">
+                <a:tint val="15000"/>
+                <a:satMod val="350000"/>
+              </a:schemeClr>
+            </a:gs>
+          </a:gsLst>
+          <a:lin ang="16200000" scaled="1"/>
+        </a:gradFill>
+        <a:gradFill rotWithShape="1">
+          <a:gsLst>
+            <a:gs pos="0">
+              <a:schemeClr val="phClr">
+                <a:tint val="100000"/>
+                <a:shade val="100000"/>
+                <a:satMod val="130000"/>
+              </a:schemeClr>
+            </a:gs>
+            <a:gs pos="100000">
+              <a:schemeClr val="phClr">
+                <a:tint val="50000"/>
+                <a:shade val="100000"/>
+                <a:satMod val="350000"/>
+              </a:schemeClr>
+            </a:gs>
+          </a:gsLst>
+          <a:lin ang="16200000" scaled="0"/>
+        </a:gradFill>
+      </a:fillStyleLst>
+      <a:lnStyleLst>
+        <a:ln w="9525" cap="flat" cmpd="sng" algn="ctr">
+          <a:solidFill>
+            <a:schemeClr val="phClr">
+              <a:shade val="95000"/>
+              <a:satMod val="105000"/>
+            </a:schemeClr>
+          </a:solidFill>
+          <a:prstDash val="solid"/>
+        </a:ln>
+        <a:ln w="25400" cap="flat" cmpd="sng" algn="ctr">
+          <a:solidFill>
+            <a:schemeClr val="phClr"/>
+          </a:solidFill>
+          <a:prstDash val="solid"/>
+        </a:ln>
+        <a:ln w="38100" cap="flat" cmpd="sng" algn="ctr">
+          <a:solidFill>
+            <a:schemeClr val="phClr"/>
+          </a:solidFill>
+          <a:prstDash val="solid"/>
+        </a:ln>
+      </a:lnStyleLst>
+      <a:effectStyleLst>
+        <a:effectStyle>
+          <a:effectLst>
+            <a:outerShdw blurRad="40000" dist="20000" dir="5400000" rotWithShape="0">
+              <a:srgbClr val="000000">
+                <a:alpha val="38000"/>
+              </a:srgbClr>
+            </a:outerShdw>
+          </a:effectLst>
+        </a:effectStyle>
+        <a:effectStyle>
+          <a:effectLst>
+            <a:outerShdw blurRad="40000" dist="23000" dir="5400000" rotWithShape="0">
+              <a:srgbClr val="000000">
+                <a:alpha val="35000"/>
+              </a:srgbClr>
+            </a:outerShdw>
+          </a:effectLst>
+        </a:effectStyle>
+        <a:effectStyle>
+          <a:effectLst>
+            <a:outerShdw blurRad="40000" dist="23000" dir="5400000" rotWithShape="0">
+              <a:srgbClr val="000000">
+                <a:alpha val="35000"/>
+              </a:srgbClr>
+            </a:outerShdw>
+          </a:effectLst>
+          <a:scene3d>
+            <a:camera prst="orthographicFront">
+              <a:rot lat="0" lon="0" rev="0"/>
+            </a:camera>
+            <a:lightRig rig="threePt" dir="t">
+              <a:rot lat="0" lon="0" rev="1200000"/>
+            </a:lightRig>
+          </a:scene3d>
+          <a:sp3d>
+            <a:bevelT w="63500" h="25400"/>
+          </a:sp3d>
+        </a:effectStyle>
+      </a:effectStyleLst>
+      <a:bgFillStyleLst>
+        <a:solidFill>
+          <a:schemeClr val="phClr"/>
+        </a:solidFill>
+        <a:gradFill rotWithShape="1">
+          <a:gsLst>
+            <a:gs pos="0">
+              <a:schemeClr val="phClr">
+                <a:tint val="40000"/>
+                <a:satMod val="350000"/>
+              </a:schemeClr>
+            </a:gs>
+            <a:gs pos="40000">
+              <a:schemeClr val="phClr">
+                <a:tint val="45000"/>
+                <a:shade val="99000"/>
+                <a:satMod val="350000"/>
+              </a:schemeClr>
+            </a:gs>
+            <a:gs pos="100000">
+              <a:schemeClr val="phClr">
+                <a:shade val="20000"/>
+                <a:satMod val="255000"/>
+              </a:schemeClr>
+            </a:gs>
+          </a:gsLst>
+          <a:path path="circle">
+            <a:fillToRect l="50000" t="-80000" r="50000" b="180000"/>
+          </a:path>
+        </a:gradFill>
+        <a:gradFill rotWithShape="1">
+          <a:gsLst>
+            <a:gs pos="0">
+              <a:schemeClr val="phClr">
+                <a:tint val="80000"/>
+                <a:satMod val="300000"/>
+              </a:schemeClr>
+            </a:gs>
+            <a:gs pos="100000">
+              <a:schemeClr val="phClr">
+                <a:shade val="30000"/>
+                <a:satMod val="200000"/>
+              </a:schemeClr>
+            </a:gs>
+          </a:gsLst>
+          <a:path path="circle">
+            <a:fillToRect l="50000" t="50000" r="50000" b="50000"/>
+          </a:path>
+        </a:gradFill>
+      </a:bgFillStyleLst>
+    </a:fmtScheme>
+  </a:themeElements>
+</a:theme>
+</file>
+
+<file path=ppt/theme/theme2.xml><?xml version="1.0" encoding="utf-8"?>
 <a:theme xmlns:a="http://schemas.openxmlformats.org/drawingml/2006/main" xmlns:r="http://schemas.openxmlformats.org/officeDocument/2006/relationships">
   <a:themeElements>
     <a:clrScheme name="Default">
@@ -8259,283 +9174,4 @@
     </a:fmtScheme>
   </a:themeElements>
 </a:theme>
-</file>
-
-<file path=ppt/theme/theme2.xml><?xml version="1.0" encoding="utf-8"?>
-<a:theme xmlns:a="http://schemas.openxmlformats.org/drawingml/2006/main" xmlns:r="http://schemas.openxmlformats.org/officeDocument/2006/relationships" name="Simple Light">
-  <a:themeElements>
-    <a:clrScheme name="Simple Light">
-      <a:dk1>
-        <a:srgbClr val="000000"/>
-      </a:dk1>
-      <a:lt1>
-        <a:srgbClr val="FFFFFF"/>
-      </a:lt1>
-      <a:dk2>
-        <a:srgbClr val="595959"/>
-      </a:dk2>
-      <a:lt2>
-        <a:srgbClr val="EEEEEE"/>
-      </a:lt2>
-      <a:accent1>
-        <a:srgbClr val="FFAB40"/>
-      </a:accent1>
-      <a:accent2>
-        <a:srgbClr val="212121"/>
-      </a:accent2>
-      <a:accent3>
-        <a:srgbClr val="78909C"/>
-      </a:accent3>
-      <a:accent4>
-        <a:srgbClr val="FFAB40"/>
-      </a:accent4>
-      <a:accent5>
-        <a:srgbClr val="0097A7"/>
-      </a:accent5>
-      <a:accent6>
-        <a:srgbClr val="EEFF41"/>
-      </a:accent6>
-      <a:hlink>
-        <a:srgbClr val="0097A7"/>
-      </a:hlink>
-      <a:folHlink>
-        <a:srgbClr val="0097A7"/>
-      </a:folHlink>
-    </a:clrScheme>
-    <a:fontScheme name="Office">
-      <a:majorFont>
-        <a:latin typeface="Arial"/>
-        <a:ea typeface=""/>
-        <a:cs typeface=""/>
-        <a:font script="Jpan" typeface="ＭＳ Ｐゴシック"/>
-        <a:font script="Hang" typeface="맑은 고딕"/>
-        <a:font script="Hans" typeface="宋体"/>
-        <a:font script="Hant" typeface="新細明體"/>
-        <a:font script="Arab" typeface="Times New Roman"/>
-        <a:font script="Hebr" typeface="Times New Roman"/>
-        <a:font script="Thai" typeface="Angsana New"/>
-        <a:font script="Ethi" typeface="Nyala"/>
-        <a:font script="Beng" typeface="Vrinda"/>
-        <a:font script="Gujr" typeface="Shruti"/>
-        <a:font script="Khmr" typeface="MoolBoran"/>
-        <a:font script="Knda" typeface="Tunga"/>
-        <a:font script="Guru" typeface="Raavi"/>
-        <a:font script="Cans" typeface="Euphemia"/>
-        <a:font script="Cher" typeface="Plantagenet Cherokee"/>
-        <a:font script="Yiii" typeface="Microsoft Yi Baiti"/>
-        <a:font script="Tibt" typeface="Microsoft Himalaya"/>
-        <a:font script="Thaa" typeface="MV Boli"/>
-        <a:font script="Deva" typeface="Mangal"/>
-        <a:font script="Telu" typeface="Gautami"/>
-        <a:font script="Taml" typeface="Latha"/>
-        <a:font script="Syrc" typeface="Estrangelo Edessa"/>
-        <a:font script="Orya" typeface="Kalinga"/>
-        <a:font script="Mlym" typeface="Kartika"/>
-        <a:font script="Laoo" typeface="DokChampa"/>
-        <a:font script="Sinh" typeface="Iskoola Pota"/>
-        <a:font script="Mong" typeface="Mongolian Baiti"/>
-        <a:font script="Viet" typeface="Times New Roman"/>
-        <a:font script="Uigh" typeface="Microsoft Uighur"/>
-        <a:font script="Geor" typeface="Sylfaen"/>
-      </a:majorFont>
-      <a:minorFont>
-        <a:latin typeface="Arial"/>
-        <a:ea typeface=""/>
-        <a:cs typeface=""/>
-        <a:font script="Jpan" typeface="ＭＳ Ｐゴシック"/>
-        <a:font script="Hang" typeface="맑은 고딕"/>
-        <a:font script="Hans" typeface="宋体"/>
-        <a:font script="Hant" typeface="新細明體"/>
-        <a:font script="Arab" typeface="Arial"/>
-        <a:font script="Hebr" typeface="Arial"/>
-        <a:font script="Thai" typeface="Cordia New"/>
-        <a:font script="Ethi" typeface="Nyala"/>
-        <a:font script="Beng" typeface="Vrinda"/>
-        <a:font script="Gujr" typeface="Shruti"/>
-        <a:font script="Khmr" typeface="DaunPenh"/>
-        <a:font script="Knda" typeface="Tunga"/>
-        <a:font script="Guru" typeface="Raavi"/>
-        <a:font script="Cans" typeface="Euphemia"/>
-        <a:font script="Cher" typeface="Plantagenet Cherokee"/>
-        <a:font script="Yiii" typeface="Microsoft Yi Baiti"/>
-        <a:font script="Tibt" typeface="Microsoft Himalaya"/>
-        <a:font script="Thaa" typeface="MV Boli"/>
-        <a:font script="Deva" typeface="Mangal"/>
-        <a:font script="Telu" typeface="Gautami"/>
-        <a:font script="Taml" typeface="Latha"/>
-        <a:font script="Syrc" typeface="Estrangelo Edessa"/>
-        <a:font script="Orya" typeface="Kalinga"/>
-        <a:font script="Mlym" typeface="Kartika"/>
-        <a:font script="Laoo" typeface="DokChampa"/>
-        <a:font script="Sinh" typeface="Iskoola Pota"/>
-        <a:font script="Mong" typeface="Mongolian Baiti"/>
-        <a:font script="Viet" typeface="Arial"/>
-        <a:font script="Uigh" typeface="Microsoft Uighur"/>
-        <a:font script="Geor" typeface="Sylfaen"/>
-      </a:minorFont>
-    </a:fontScheme>
-    <a:fmtScheme name="Office">
-      <a:fillStyleLst>
-        <a:solidFill>
-          <a:schemeClr val="phClr"/>
-        </a:solidFill>
-        <a:gradFill rotWithShape="1">
-          <a:gsLst>
-            <a:gs pos="0">
-              <a:schemeClr val="phClr">
-                <a:tint val="50000"/>
-                <a:satMod val="300000"/>
-              </a:schemeClr>
-            </a:gs>
-            <a:gs pos="35000">
-              <a:schemeClr val="phClr">
-                <a:tint val="37000"/>
-                <a:satMod val="300000"/>
-              </a:schemeClr>
-            </a:gs>
-            <a:gs pos="100000">
-              <a:schemeClr val="phClr">
-                <a:tint val="15000"/>
-                <a:satMod val="350000"/>
-              </a:schemeClr>
-            </a:gs>
-          </a:gsLst>
-          <a:lin ang="16200000" scaled="1"/>
-        </a:gradFill>
-        <a:gradFill rotWithShape="1">
-          <a:gsLst>
-            <a:gs pos="0">
-              <a:schemeClr val="phClr">
-                <a:tint val="100000"/>
-                <a:shade val="100000"/>
-                <a:satMod val="130000"/>
-              </a:schemeClr>
-            </a:gs>
-            <a:gs pos="100000">
-              <a:schemeClr val="phClr">
-                <a:tint val="50000"/>
-                <a:shade val="100000"/>
-                <a:satMod val="350000"/>
-              </a:schemeClr>
-            </a:gs>
-          </a:gsLst>
-          <a:lin ang="16200000" scaled="0"/>
-        </a:gradFill>
-      </a:fillStyleLst>
-      <a:lnStyleLst>
-        <a:ln w="9525" cap="flat" cmpd="sng" algn="ctr">
-          <a:solidFill>
-            <a:schemeClr val="phClr">
-              <a:shade val="95000"/>
-              <a:satMod val="105000"/>
-            </a:schemeClr>
-          </a:solidFill>
-          <a:prstDash val="solid"/>
-        </a:ln>
-        <a:ln w="25400" cap="flat" cmpd="sng" algn="ctr">
-          <a:solidFill>
-            <a:schemeClr val="phClr"/>
-          </a:solidFill>
-          <a:prstDash val="solid"/>
-        </a:ln>
-        <a:ln w="38100" cap="flat" cmpd="sng" algn="ctr">
-          <a:solidFill>
-            <a:schemeClr val="phClr"/>
-          </a:solidFill>
-          <a:prstDash val="solid"/>
-        </a:ln>
-      </a:lnStyleLst>
-      <a:effectStyleLst>
-        <a:effectStyle>
-          <a:effectLst>
-            <a:outerShdw blurRad="40000" dist="20000" dir="5400000" rotWithShape="0">
-              <a:srgbClr val="000000">
-                <a:alpha val="38000"/>
-              </a:srgbClr>
-            </a:outerShdw>
-          </a:effectLst>
-        </a:effectStyle>
-        <a:effectStyle>
-          <a:effectLst>
-            <a:outerShdw blurRad="40000" dist="23000" dir="5400000" rotWithShape="0">
-              <a:srgbClr val="000000">
-                <a:alpha val="35000"/>
-              </a:srgbClr>
-            </a:outerShdw>
-          </a:effectLst>
-        </a:effectStyle>
-        <a:effectStyle>
-          <a:effectLst>
-            <a:outerShdw blurRad="40000" dist="23000" dir="5400000" rotWithShape="0">
-              <a:srgbClr val="000000">
-                <a:alpha val="35000"/>
-              </a:srgbClr>
-            </a:outerShdw>
-          </a:effectLst>
-          <a:scene3d>
-            <a:camera prst="orthographicFront">
-              <a:rot lat="0" lon="0" rev="0"/>
-            </a:camera>
-            <a:lightRig rig="threePt" dir="t">
-              <a:rot lat="0" lon="0" rev="1200000"/>
-            </a:lightRig>
-          </a:scene3d>
-          <a:sp3d>
-            <a:bevelT w="63500" h="25400"/>
-          </a:sp3d>
-        </a:effectStyle>
-      </a:effectStyleLst>
-      <a:bgFillStyleLst>
-        <a:solidFill>
-          <a:schemeClr val="phClr"/>
-        </a:solidFill>
-        <a:gradFill rotWithShape="1">
-          <a:gsLst>
-            <a:gs pos="0">
-              <a:schemeClr val="phClr">
-                <a:tint val="40000"/>
-                <a:satMod val="350000"/>
-              </a:schemeClr>
-            </a:gs>
-            <a:gs pos="40000">
-              <a:schemeClr val="phClr">
-                <a:tint val="45000"/>
-                <a:shade val="99000"/>
-                <a:satMod val="350000"/>
-              </a:schemeClr>
-            </a:gs>
-            <a:gs pos="100000">
-              <a:schemeClr val="phClr">
-                <a:shade val="20000"/>
-                <a:satMod val="255000"/>
-              </a:schemeClr>
-            </a:gs>
-          </a:gsLst>
-          <a:path path="circle">
-            <a:fillToRect l="50000" t="-80000" r="50000" b="180000"/>
-          </a:path>
-        </a:gradFill>
-        <a:gradFill rotWithShape="1">
-          <a:gsLst>
-            <a:gs pos="0">
-              <a:schemeClr val="phClr">
-                <a:tint val="80000"/>
-                <a:satMod val="300000"/>
-              </a:schemeClr>
-            </a:gs>
-            <a:gs pos="100000">
-              <a:schemeClr val="phClr">
-                <a:shade val="30000"/>
-                <a:satMod val="200000"/>
-              </a:schemeClr>
-            </a:gs>
-          </a:gsLst>
-          <a:path path="circle">
-            <a:fillToRect l="50000" t="50000" r="50000" b="50000"/>
-          </a:path>
-        </a:gradFill>
-      </a:bgFillStyleLst>
-    </a:fmtScheme>
-  </a:themeElements>
-</a:theme>
 </file>
</xml_diff>